<commit_message>
finish ppt for education of 19
</commit_message>
<xml_diff>
--- a/Algorithms/Data_Structure/HeapBasedPriorityQueue/Heap.pptx
+++ b/Algorithms/Data_Structure/HeapBasedPriorityQueue/Heap.pptx
@@ -15,13 +15,15 @@
     <p:sldId id="258" r:id="rId9"/>
     <p:sldId id="259" r:id="rId10"/>
     <p:sldId id="260" r:id="rId11"/>
-    <p:sldId id="261" r:id="rId12"/>
-    <p:sldId id="262" r:id="rId13"/>
-    <p:sldId id="263" r:id="rId14"/>
-    <p:sldId id="264" r:id="rId15"/>
-    <p:sldId id="265" r:id="rId16"/>
-    <p:sldId id="266" r:id="rId17"/>
-    <p:sldId id="272" r:id="rId18"/>
+    <p:sldId id="273" r:id="rId12"/>
+    <p:sldId id="261" r:id="rId13"/>
+    <p:sldId id="262" r:id="rId14"/>
+    <p:sldId id="263" r:id="rId15"/>
+    <p:sldId id="264" r:id="rId16"/>
+    <p:sldId id="265" r:id="rId17"/>
+    <p:sldId id="266" r:id="rId18"/>
+    <p:sldId id="272" r:id="rId19"/>
+    <p:sldId id="274" r:id="rId20"/>
   </p:sldIdLst>
   <p:sldSz cx="9144000" cy="6858000" type="screen4x3"/>
   <p:notesSz cx="6858000" cy="9144000"/>
@@ -143,6 +145,7 @@
             <p14:sldId id="258"/>
             <p14:sldId id="259"/>
             <p14:sldId id="260"/>
+            <p14:sldId id="273"/>
             <p14:sldId id="261"/>
             <p14:sldId id="262"/>
             <p14:sldId id="263"/>
@@ -154,6 +157,7 @@
         <p14:section name="标准库里的堆" id="{165F8138-2970-4B36-9F6E-7EA146B65FE7}">
           <p14:sldIdLst>
             <p14:sldId id="272"/>
+            <p14:sldId id="274"/>
           </p14:sldIdLst>
         </p14:section>
       </p14:sectionLst>
@@ -322,7 +326,7 @@
           <a:p>
             <a:fld id="{786EC6CD-293F-4B8A-870B-46761076898A}" type="datetimeFigureOut">
               <a:rPr lang="zh-CN" altLang="en-US" smtClean="0"/>
-              <a:t>2019-12-16</a:t>
+              <a:t>2020-01-11</a:t>
             </a:fld>
             <a:endParaRPr lang="zh-CN" altLang="en-US"/>
           </a:p>
@@ -492,7 +496,7 @@
           <a:p>
             <a:fld id="{786EC6CD-293F-4B8A-870B-46761076898A}" type="datetimeFigureOut">
               <a:rPr lang="zh-CN" altLang="en-US" smtClean="0"/>
-              <a:t>2019-12-16</a:t>
+              <a:t>2020-01-11</a:t>
             </a:fld>
             <a:endParaRPr lang="zh-CN" altLang="en-US"/>
           </a:p>
@@ -672,7 +676,7 @@
           <a:p>
             <a:fld id="{786EC6CD-293F-4B8A-870B-46761076898A}" type="datetimeFigureOut">
               <a:rPr lang="zh-CN" altLang="en-US" smtClean="0"/>
-              <a:t>2019-12-16</a:t>
+              <a:t>2020-01-11</a:t>
             </a:fld>
             <a:endParaRPr lang="zh-CN" altLang="en-US"/>
           </a:p>
@@ -842,7 +846,7 @@
           <a:p>
             <a:fld id="{786EC6CD-293F-4B8A-870B-46761076898A}" type="datetimeFigureOut">
               <a:rPr lang="zh-CN" altLang="en-US" smtClean="0"/>
-              <a:t>2019-12-16</a:t>
+              <a:t>2020-01-11</a:t>
             </a:fld>
             <a:endParaRPr lang="zh-CN" altLang="en-US"/>
           </a:p>
@@ -1086,7 +1090,7 @@
           <a:p>
             <a:fld id="{786EC6CD-293F-4B8A-870B-46761076898A}" type="datetimeFigureOut">
               <a:rPr lang="zh-CN" altLang="en-US" smtClean="0"/>
-              <a:t>2019-12-16</a:t>
+              <a:t>2020-01-11</a:t>
             </a:fld>
             <a:endParaRPr lang="zh-CN" altLang="en-US"/>
           </a:p>
@@ -1318,7 +1322,7 @@
           <a:p>
             <a:fld id="{786EC6CD-293F-4B8A-870B-46761076898A}" type="datetimeFigureOut">
               <a:rPr lang="zh-CN" altLang="en-US" smtClean="0"/>
-              <a:t>2019-12-16</a:t>
+              <a:t>2020-01-11</a:t>
             </a:fld>
             <a:endParaRPr lang="zh-CN" altLang="en-US"/>
           </a:p>
@@ -1685,7 +1689,7 @@
           <a:p>
             <a:fld id="{786EC6CD-293F-4B8A-870B-46761076898A}" type="datetimeFigureOut">
               <a:rPr lang="zh-CN" altLang="en-US" smtClean="0"/>
-              <a:t>2019-12-16</a:t>
+              <a:t>2020-01-11</a:t>
             </a:fld>
             <a:endParaRPr lang="zh-CN" altLang="en-US"/>
           </a:p>
@@ -1803,7 +1807,7 @@
           <a:p>
             <a:fld id="{786EC6CD-293F-4B8A-870B-46761076898A}" type="datetimeFigureOut">
               <a:rPr lang="zh-CN" altLang="en-US" smtClean="0"/>
-              <a:t>2019-12-16</a:t>
+              <a:t>2020-01-11</a:t>
             </a:fld>
             <a:endParaRPr lang="zh-CN" altLang="en-US"/>
           </a:p>
@@ -1898,7 +1902,7 @@
           <a:p>
             <a:fld id="{786EC6CD-293F-4B8A-870B-46761076898A}" type="datetimeFigureOut">
               <a:rPr lang="zh-CN" altLang="en-US" smtClean="0"/>
-              <a:t>2019-12-16</a:t>
+              <a:t>2020-01-11</a:t>
             </a:fld>
             <a:endParaRPr lang="zh-CN" altLang="en-US"/>
           </a:p>
@@ -2175,7 +2179,7 @@
           <a:p>
             <a:fld id="{786EC6CD-293F-4B8A-870B-46761076898A}" type="datetimeFigureOut">
               <a:rPr lang="zh-CN" altLang="en-US" smtClean="0"/>
-              <a:t>2019-12-16</a:t>
+              <a:t>2020-01-11</a:t>
             </a:fld>
             <a:endParaRPr lang="zh-CN" altLang="en-US"/>
           </a:p>
@@ -2432,7 +2436,7 @@
           <a:p>
             <a:fld id="{786EC6CD-293F-4B8A-870B-46761076898A}" type="datetimeFigureOut">
               <a:rPr lang="zh-CN" altLang="en-US" smtClean="0"/>
-              <a:t>2019-12-16</a:t>
+              <a:t>2020-01-11</a:t>
             </a:fld>
             <a:endParaRPr lang="zh-CN" altLang="en-US"/>
           </a:p>
@@ -2645,7 +2649,7 @@
           <a:p>
             <a:fld id="{786EC6CD-293F-4B8A-870B-46761076898A}" type="datetimeFigureOut">
               <a:rPr lang="zh-CN" altLang="en-US" smtClean="0"/>
-              <a:t>2019-12-16</a:t>
+              <a:t>2020-01-11</a:t>
             </a:fld>
             <a:endParaRPr lang="zh-CN" altLang="en-US"/>
           </a:p>
@@ -3327,6 +3331,94 @@
           <p:cNvPr id="2" name="标题 1">
             <a:extLst>
               <a:ext uri="{FF2B5EF4-FFF2-40B4-BE49-F238E27FC236}">
+                <a16:creationId xmlns:a16="http://schemas.microsoft.com/office/drawing/2014/main" id="{83D7B2EB-3640-4C17-A9AA-5377CEA5A0DC}"/>
+              </a:ext>
+            </a:extLst>
+          </p:cNvPr>
+          <p:cNvSpPr>
+            <a:spLocks noGrp="1"/>
+          </p:cNvSpPr>
+          <p:nvPr>
+            <p:ph type="title"/>
+          </p:nvPr>
+        </p:nvSpPr>
+        <p:spPr/>
+        <p:txBody>
+          <a:bodyPr/>
+          <a:lstStyle/>
+          <a:p>
+            <a:r>
+              <a:rPr lang="zh-CN" altLang="en-US" dirty="0"/>
+              <a:t>顶部的元素最大</a:t>
+            </a:r>
+          </a:p>
+        </p:txBody>
+      </p:sp>
+      <p:pic>
+        <p:nvPicPr>
+          <p:cNvPr id="4" name="图片 3">
+            <a:extLst>
+              <a:ext uri="{FF2B5EF4-FFF2-40B4-BE49-F238E27FC236}">
+                <a16:creationId xmlns:a16="http://schemas.microsoft.com/office/drawing/2014/main" id="{F2F306A8-5A14-4A22-AB53-966396BF3147}"/>
+              </a:ext>
+            </a:extLst>
+          </p:cNvPr>
+          <p:cNvPicPr>
+            <a:picLocks noChangeAspect="1"/>
+          </p:cNvPicPr>
+          <p:nvPr/>
+        </p:nvPicPr>
+        <p:blipFill>
+          <a:blip r:embed="rId2"/>
+          <a:stretch>
+            <a:fillRect/>
+          </a:stretch>
+        </p:blipFill>
+        <p:spPr>
+          <a:xfrm>
+            <a:off x="0" y="2943804"/>
+            <a:ext cx="9144000" cy="2452994"/>
+          </a:xfrm>
+          <a:prstGeom prst="rect">
+            <a:avLst/>
+          </a:prstGeom>
+        </p:spPr>
+      </p:pic>
+    </p:spTree>
+    <p:extLst>
+      <p:ext uri="{BB962C8B-B14F-4D97-AF65-F5344CB8AC3E}">
+        <p14:creationId xmlns:p14="http://schemas.microsoft.com/office/powerpoint/2010/main" val="521468467"/>
+      </p:ext>
+    </p:extLst>
+  </p:cSld>
+  <p:clrMapOvr>
+    <a:masterClrMapping/>
+  </p:clrMapOvr>
+</p:sld>
+</file>
+
+<file path=ppt/slides/slide12.xml><?xml version="1.0" encoding="utf-8"?>
+<p:sld xmlns:a="http://schemas.openxmlformats.org/drawingml/2006/main" xmlns:r="http://schemas.openxmlformats.org/officeDocument/2006/relationships" xmlns:p="http://schemas.openxmlformats.org/presentationml/2006/main">
+  <p:cSld>
+    <p:spTree>
+      <p:nvGrpSpPr>
+        <p:cNvPr id="1" name=""/>
+        <p:cNvGrpSpPr/>
+        <p:nvPr/>
+      </p:nvGrpSpPr>
+      <p:grpSpPr>
+        <a:xfrm>
+          <a:off x="0" y="0"/>
+          <a:ext cx="0" cy="0"/>
+          <a:chOff x="0" y="0"/>
+          <a:chExt cx="0" cy="0"/>
+        </a:xfrm>
+      </p:grpSpPr>
+      <p:sp>
+        <p:nvSpPr>
+          <p:cNvPr id="2" name="标题 1">
+            <a:extLst>
+              <a:ext uri="{FF2B5EF4-FFF2-40B4-BE49-F238E27FC236}">
                 <a16:creationId xmlns:a16="http://schemas.microsoft.com/office/drawing/2014/main" id="{D01EADCF-8AA3-4CAF-BD77-BEADF9D977C7}"/>
               </a:ext>
             </a:extLst>
@@ -3616,603 +3708,6 @@
 </p:sld>
 </file>
 
-<file path=ppt/slides/slide12.xml><?xml version="1.0" encoding="utf-8"?>
-<p:sld xmlns:a="http://schemas.openxmlformats.org/drawingml/2006/main" xmlns:r="http://schemas.openxmlformats.org/officeDocument/2006/relationships" xmlns:p="http://schemas.openxmlformats.org/presentationml/2006/main">
-  <p:cSld>
-    <p:spTree>
-      <p:nvGrpSpPr>
-        <p:cNvPr id="1" name=""/>
-        <p:cNvGrpSpPr/>
-        <p:nvPr/>
-      </p:nvGrpSpPr>
-      <p:grpSpPr>
-        <a:xfrm>
-          <a:off x="0" y="0"/>
-          <a:ext cx="0" cy="0"/>
-          <a:chOff x="0" y="0"/>
-          <a:chExt cx="0" cy="0"/>
-        </a:xfrm>
-      </p:grpSpPr>
-      <p:sp>
-        <p:nvSpPr>
-          <p:cNvPr id="2" name="标题 1">
-            <a:extLst>
-              <a:ext uri="{FF2B5EF4-FFF2-40B4-BE49-F238E27FC236}">
-                <a16:creationId xmlns:a16="http://schemas.microsoft.com/office/drawing/2014/main" id="{5333D4E9-A686-4EBD-8258-4FF101B88FF1}"/>
-              </a:ext>
-            </a:extLst>
-          </p:cNvPr>
-          <p:cNvSpPr>
-            <a:spLocks noGrp="1"/>
-          </p:cNvSpPr>
-          <p:nvPr>
-            <p:ph type="title"/>
-          </p:nvPr>
-        </p:nvSpPr>
-        <p:spPr/>
-        <p:txBody>
-          <a:bodyPr/>
-          <a:lstStyle/>
-          <a:p>
-            <a:r>
-              <a:rPr lang="zh-CN" altLang="en-US" dirty="0"/>
-              <a:t>维护</a:t>
-            </a:r>
-          </a:p>
-        </p:txBody>
-      </p:sp>
-      <p:sp>
-        <p:nvSpPr>
-          <p:cNvPr id="5" name="文本框 4">
-            <a:extLst>
-              <a:ext uri="{FF2B5EF4-FFF2-40B4-BE49-F238E27FC236}">
-                <a16:creationId xmlns:a16="http://schemas.microsoft.com/office/drawing/2014/main" id="{394D2450-17FE-459B-85AD-10FF5376C628}"/>
-              </a:ext>
-            </a:extLst>
-          </p:cNvPr>
-          <p:cNvSpPr txBox="1"/>
-          <p:nvPr/>
-        </p:nvSpPr>
-        <p:spPr>
-          <a:xfrm>
-            <a:off x="914400" y="1257300"/>
-            <a:ext cx="7405688" cy="5355312"/>
-          </a:xfrm>
-          <a:prstGeom prst="rect">
-            <a:avLst/>
-          </a:prstGeom>
-          <a:noFill/>
-        </p:spPr>
-        <p:txBody>
-          <a:bodyPr wrap="square" rtlCol="0">
-            <a:spAutoFit/>
-          </a:bodyPr>
-          <a:lstStyle/>
-          <a:p>
-            <a:r>
-              <a:rPr lang="en-US" altLang="zh-CN" dirty="0"/>
-              <a:t>    template&lt;class </a:t>
-            </a:r>
-            <a:r>
-              <a:rPr lang="en-US" altLang="zh-CN" dirty="0">
-                <a:solidFill>
-                  <a:schemeClr val="accent4">
-                    <a:lumMod val="75000"/>
-                  </a:schemeClr>
-                </a:solidFill>
-              </a:rPr>
-              <a:t>T</a:t>
-            </a:r>
-            <a:r>
-              <a:rPr lang="en-US" altLang="zh-CN" dirty="0"/>
-              <a:t>&gt;void </a:t>
-            </a:r>
-            <a:r>
-              <a:rPr lang="en-US" altLang="zh-CN" dirty="0" err="1">
-                <a:solidFill>
-                  <a:schemeClr val="accent4">
-                    <a:lumMod val="75000"/>
-                  </a:schemeClr>
-                </a:solidFill>
-              </a:rPr>
-              <a:t>P_Queue</a:t>
-            </a:r>
-            <a:r>
-              <a:rPr lang="en-US" altLang="zh-CN" dirty="0"/>
-              <a:t>&lt;</a:t>
-            </a:r>
-            <a:r>
-              <a:rPr lang="en-US" altLang="zh-CN" dirty="0">
-                <a:solidFill>
-                  <a:schemeClr val="accent4">
-                    <a:lumMod val="75000"/>
-                  </a:schemeClr>
-                </a:solidFill>
-              </a:rPr>
-              <a:t>T</a:t>
-            </a:r>
-            <a:r>
-              <a:rPr lang="en-US" altLang="zh-CN" dirty="0"/>
-              <a:t>&gt;::</a:t>
-            </a:r>
-            <a:r>
-              <a:rPr lang="en-US" altLang="zh-CN" dirty="0" err="1">
-                <a:solidFill>
-                  <a:schemeClr val="accent6">
-                    <a:lumMod val="50000"/>
-                  </a:schemeClr>
-                </a:solidFill>
-              </a:rPr>
-              <a:t>matainHeap</a:t>
-            </a:r>
-            <a:r>
-              <a:rPr lang="en-US" altLang="zh-CN" dirty="0"/>
-              <a:t>(</a:t>
-            </a:r>
-            <a:r>
-              <a:rPr lang="en-US" altLang="zh-CN" dirty="0" err="1">
-                <a:solidFill>
-                  <a:schemeClr val="accent4">
-                    <a:lumMod val="75000"/>
-                  </a:schemeClr>
-                </a:solidFill>
-              </a:rPr>
-              <a:t>size_t</a:t>
-            </a:r>
-            <a:r>
-              <a:rPr lang="en-US" altLang="zh-CN" dirty="0">
-                <a:solidFill>
-                  <a:schemeClr val="accent4">
-                    <a:lumMod val="75000"/>
-                  </a:schemeClr>
-                </a:solidFill>
-              </a:rPr>
-              <a:t> </a:t>
-            </a:r>
-            <a:r>
-              <a:rPr lang="en-US" altLang="zh-CN" dirty="0"/>
-              <a:t>target)</a:t>
-            </a:r>
-          </a:p>
-          <a:p>
-            <a:r>
-              <a:rPr lang="en-US" altLang="zh-CN" dirty="0"/>
-              <a:t>    {</a:t>
-            </a:r>
-          </a:p>
-          <a:p>
-            <a:r>
-              <a:rPr lang="en-US" altLang="zh-CN" dirty="0"/>
-              <a:t>        </a:t>
-            </a:r>
-            <a:r>
-              <a:rPr lang="en-US" altLang="zh-CN" dirty="0" err="1">
-                <a:solidFill>
-                  <a:schemeClr val="accent4">
-                    <a:lumMod val="75000"/>
-                  </a:schemeClr>
-                </a:solidFill>
-              </a:rPr>
-              <a:t>size_t</a:t>
-            </a:r>
-            <a:r>
-              <a:rPr lang="en-US" altLang="zh-CN" dirty="0"/>
-              <a:t> next = target;</a:t>
-            </a:r>
-          </a:p>
-          <a:p>
-            <a:r>
-              <a:rPr lang="en-US" altLang="zh-CN" dirty="0"/>
-              <a:t>        </a:t>
-            </a:r>
-            <a:r>
-              <a:rPr lang="en-US" altLang="zh-CN" dirty="0">
-                <a:solidFill>
-                  <a:schemeClr val="accent2">
-                    <a:lumMod val="75000"/>
-                  </a:schemeClr>
-                </a:solidFill>
-              </a:rPr>
-              <a:t>while</a:t>
-            </a:r>
-            <a:r>
-              <a:rPr lang="en-US" altLang="zh-CN" dirty="0"/>
-              <a:t> (</a:t>
-            </a:r>
-            <a:r>
-              <a:rPr lang="en-US" altLang="zh-CN" dirty="0">
-                <a:solidFill>
-                  <a:srgbClr val="0070C0"/>
-                </a:solidFill>
-              </a:rPr>
-              <a:t>true</a:t>
-            </a:r>
-            <a:r>
-              <a:rPr lang="en-US" altLang="zh-CN" dirty="0"/>
-              <a:t>)</a:t>
-            </a:r>
-          </a:p>
-          <a:p>
-            <a:r>
-              <a:rPr lang="en-US" altLang="zh-CN" dirty="0"/>
-              <a:t>        {</a:t>
-            </a:r>
-          </a:p>
-          <a:p>
-            <a:br>
-              <a:rPr lang="en-US" altLang="zh-CN" dirty="0"/>
-            </a:br>
-            <a:r>
-              <a:rPr lang="en-US" altLang="zh-CN" dirty="0"/>
-              <a:t>            </a:t>
-            </a:r>
-            <a:r>
-              <a:rPr lang="en-US" altLang="zh-CN" dirty="0">
-                <a:solidFill>
-                  <a:schemeClr val="accent2">
-                    <a:lumMod val="75000"/>
-                  </a:schemeClr>
-                </a:solidFill>
-              </a:rPr>
-              <a:t>if</a:t>
-            </a:r>
-            <a:r>
-              <a:rPr lang="en-US" altLang="zh-CN" dirty="0"/>
-              <a:t> (Heap[target] &lt; Heap[</a:t>
-            </a:r>
-            <a:r>
-              <a:rPr lang="en-US" altLang="zh-CN" dirty="0">
-                <a:solidFill>
-                  <a:schemeClr val="accent6">
-                    <a:lumMod val="50000"/>
-                  </a:schemeClr>
-                </a:solidFill>
-              </a:rPr>
-              <a:t>left</a:t>
-            </a:r>
-            <a:r>
-              <a:rPr lang="en-US" altLang="zh-CN" dirty="0"/>
-              <a:t>(target)])</a:t>
-            </a:r>
-          </a:p>
-          <a:p>
-            <a:r>
-              <a:rPr lang="en-US" altLang="zh-CN" dirty="0"/>
-              <a:t>            {next = </a:t>
-            </a:r>
-            <a:r>
-              <a:rPr lang="en-US" altLang="zh-CN" dirty="0">
-                <a:solidFill>
-                  <a:schemeClr val="accent6">
-                    <a:lumMod val="50000"/>
-                  </a:schemeClr>
-                </a:solidFill>
-              </a:rPr>
-              <a:t>left</a:t>
-            </a:r>
-            <a:r>
-              <a:rPr lang="en-US" altLang="zh-CN" dirty="0"/>
-              <a:t>(target);}</a:t>
-            </a:r>
-          </a:p>
-          <a:p>
-            <a:r>
-              <a:rPr lang="en-US" altLang="zh-CN" dirty="0"/>
-              <a:t>            </a:t>
-            </a:r>
-            <a:r>
-              <a:rPr lang="en-US" altLang="zh-CN" dirty="0">
-                <a:solidFill>
-                  <a:schemeClr val="accent2">
-                    <a:lumMod val="75000"/>
-                  </a:schemeClr>
-                </a:solidFill>
-              </a:rPr>
-              <a:t>else</a:t>
-            </a:r>
-            <a:r>
-              <a:rPr lang="en-US" altLang="zh-CN" dirty="0"/>
-              <a:t> </a:t>
-            </a:r>
-            <a:r>
-              <a:rPr lang="en-US" altLang="zh-CN" dirty="0">
-                <a:solidFill>
-                  <a:schemeClr val="accent2">
-                    <a:lumMod val="75000"/>
-                  </a:schemeClr>
-                </a:solidFill>
-              </a:rPr>
-              <a:t>if</a:t>
-            </a:r>
-            <a:r>
-              <a:rPr lang="en-US" altLang="zh-CN" dirty="0"/>
-              <a:t> (Heap[next] &lt; Heap[</a:t>
-            </a:r>
-            <a:r>
-              <a:rPr lang="en-US" altLang="zh-CN" dirty="0">
-                <a:solidFill>
-                  <a:schemeClr val="accent6">
-                    <a:lumMod val="50000"/>
-                  </a:schemeClr>
-                </a:solidFill>
-              </a:rPr>
-              <a:t>right</a:t>
-            </a:r>
-            <a:r>
-              <a:rPr lang="en-US" altLang="zh-CN" dirty="0"/>
-              <a:t>(target)])</a:t>
-            </a:r>
-          </a:p>
-          <a:p>
-            <a:r>
-              <a:rPr lang="en-US" altLang="zh-CN" dirty="0"/>
-              <a:t>            {next = </a:t>
-            </a:r>
-            <a:r>
-              <a:rPr lang="en-US" altLang="zh-CN" dirty="0">
-                <a:solidFill>
-                  <a:schemeClr val="accent6">
-                    <a:lumMod val="50000"/>
-                  </a:schemeClr>
-                </a:solidFill>
-              </a:rPr>
-              <a:t>right</a:t>
-            </a:r>
-            <a:r>
-              <a:rPr lang="en-US" altLang="zh-CN" dirty="0"/>
-              <a:t>(target);}</a:t>
-            </a:r>
-            <a:r>
-              <a:rPr lang="en-US" altLang="zh-CN" dirty="0">
-                <a:solidFill>
-                  <a:schemeClr val="accent6">
-                    <a:lumMod val="75000"/>
-                  </a:schemeClr>
-                </a:solidFill>
-              </a:rPr>
-              <a:t>//</a:t>
-            </a:r>
-            <a:r>
-              <a:rPr lang="zh-CN" altLang="en-US" dirty="0">
-                <a:solidFill>
-                  <a:schemeClr val="accent6">
-                    <a:lumMod val="75000"/>
-                  </a:schemeClr>
-                </a:solidFill>
-              </a:rPr>
-              <a:t>找到父节点和子节点中比较大的那个</a:t>
-            </a:r>
-          </a:p>
-          <a:p>
-            <a:r>
-              <a:rPr lang="zh-CN" altLang="en-US" dirty="0"/>
-              <a:t>            </a:t>
-            </a:r>
-            <a:r>
-              <a:rPr lang="en-US" altLang="zh-CN" dirty="0">
-                <a:solidFill>
-                  <a:schemeClr val="accent2">
-                    <a:lumMod val="75000"/>
-                  </a:schemeClr>
-                </a:solidFill>
-              </a:rPr>
-              <a:t>if</a:t>
-            </a:r>
-            <a:r>
-              <a:rPr lang="en-US" altLang="zh-CN" dirty="0"/>
-              <a:t> (next != target)</a:t>
-            </a:r>
-            <a:r>
-              <a:rPr lang="en-US" altLang="zh-CN" dirty="0">
-                <a:solidFill>
-                  <a:schemeClr val="accent6">
-                    <a:lumMod val="75000"/>
-                  </a:schemeClr>
-                </a:solidFill>
-              </a:rPr>
-              <a:t>//</a:t>
-            </a:r>
-            <a:r>
-              <a:rPr lang="zh-CN" altLang="en-US" dirty="0">
-                <a:solidFill>
-                  <a:schemeClr val="accent6">
-                    <a:lumMod val="75000"/>
-                  </a:schemeClr>
-                </a:solidFill>
-              </a:rPr>
-              <a:t>如果不是父节点就交换</a:t>
-            </a:r>
-          </a:p>
-          <a:p>
-            <a:r>
-              <a:rPr lang="zh-CN" altLang="en-US" dirty="0"/>
-              <a:t>            </a:t>
-            </a:r>
-            <a:r>
-              <a:rPr lang="en-US" altLang="zh-CN" dirty="0"/>
-              <a:t>{</a:t>
-            </a:r>
-          </a:p>
-          <a:p>
-            <a:r>
-              <a:rPr lang="en-US" altLang="zh-CN" dirty="0"/>
-              <a:t>                </a:t>
-            </a:r>
-            <a:r>
-              <a:rPr lang="en-US" altLang="zh-CN" dirty="0">
-                <a:solidFill>
-                  <a:schemeClr val="accent6">
-                    <a:lumMod val="60000"/>
-                    <a:lumOff val="40000"/>
-                  </a:schemeClr>
-                </a:solidFill>
-              </a:rPr>
-              <a:t>std</a:t>
-            </a:r>
-            <a:r>
-              <a:rPr lang="en-US" altLang="zh-CN" dirty="0"/>
-              <a:t>::</a:t>
-            </a:r>
-            <a:r>
-              <a:rPr lang="en-US" altLang="zh-CN" dirty="0">
-                <a:solidFill>
-                  <a:schemeClr val="accent6">
-                    <a:lumMod val="50000"/>
-                  </a:schemeClr>
-                </a:solidFill>
-              </a:rPr>
-              <a:t>swap</a:t>
-            </a:r>
-            <a:r>
-              <a:rPr lang="en-US" altLang="zh-CN" dirty="0"/>
-              <a:t>(Heap[next], Heap[target]);</a:t>
-            </a:r>
-          </a:p>
-          <a:p>
-            <a:r>
-              <a:rPr lang="en-US" altLang="zh-CN" dirty="0"/>
-              <a:t>                target = next;</a:t>
-            </a:r>
-          </a:p>
-          <a:p>
-            <a:r>
-              <a:rPr lang="en-US" altLang="zh-CN" dirty="0"/>
-              <a:t>            }</a:t>
-            </a:r>
-          </a:p>
-          <a:p>
-            <a:r>
-              <a:rPr lang="en-US" altLang="zh-CN" dirty="0"/>
-              <a:t>            </a:t>
-            </a:r>
-            <a:r>
-              <a:rPr lang="en-US" altLang="zh-CN" dirty="0">
-                <a:solidFill>
-                  <a:schemeClr val="accent2">
-                    <a:lumMod val="75000"/>
-                  </a:schemeClr>
-                </a:solidFill>
-              </a:rPr>
-              <a:t>else</a:t>
-            </a:r>
-            <a:r>
-              <a:rPr lang="en-US" altLang="zh-CN" dirty="0"/>
-              <a:t>{</a:t>
-            </a:r>
-            <a:r>
-              <a:rPr lang="en-US" altLang="zh-CN" dirty="0">
-                <a:solidFill>
-                  <a:schemeClr val="accent5">
-                    <a:lumMod val="75000"/>
-                  </a:schemeClr>
-                </a:solidFill>
-              </a:rPr>
-              <a:t>return</a:t>
-            </a:r>
-            <a:r>
-              <a:rPr lang="en-US" altLang="zh-CN" dirty="0"/>
-              <a:t>;}</a:t>
-            </a:r>
-            <a:r>
-              <a:rPr lang="en-US" altLang="zh-CN" dirty="0">
-                <a:solidFill>
-                  <a:schemeClr val="accent6">
-                    <a:lumMod val="75000"/>
-                  </a:schemeClr>
-                </a:solidFill>
-              </a:rPr>
-              <a:t>//</a:t>
-            </a:r>
-            <a:r>
-              <a:rPr lang="zh-CN" altLang="en-US" dirty="0">
-                <a:solidFill>
-                  <a:schemeClr val="accent6">
-                    <a:lumMod val="75000"/>
-                  </a:schemeClr>
-                </a:solidFill>
-              </a:rPr>
-              <a:t>是则说明这个节点满足性质，可以收工了</a:t>
-            </a:r>
-          </a:p>
-          <a:p>
-            <a:r>
-              <a:rPr lang="zh-CN" altLang="en-US" dirty="0"/>
-              <a:t>        </a:t>
-            </a:r>
-            <a:r>
-              <a:rPr lang="en-US" altLang="zh-CN" dirty="0"/>
-              <a:t>}</a:t>
-            </a:r>
-            <a:r>
-              <a:rPr lang="en-US" altLang="zh-CN" dirty="0">
-                <a:solidFill>
-                  <a:schemeClr val="accent6">
-                    <a:lumMod val="75000"/>
-                  </a:schemeClr>
-                </a:solidFill>
-              </a:rPr>
-              <a:t>//</a:t>
-            </a:r>
-            <a:r>
-              <a:rPr lang="zh-CN" altLang="en-US" dirty="0">
-                <a:solidFill>
-                  <a:schemeClr val="accent6">
-                    <a:lumMod val="75000"/>
-                  </a:schemeClr>
-                </a:solidFill>
-              </a:rPr>
-              <a:t>继续维护性质</a:t>
-            </a:r>
-          </a:p>
-          <a:p>
-            <a:r>
-              <a:rPr lang="zh-CN" altLang="en-US" dirty="0"/>
-              <a:t>    </a:t>
-            </a:r>
-            <a:r>
-              <a:rPr lang="en-US" altLang="zh-CN" dirty="0"/>
-              <a:t>}</a:t>
-            </a:r>
-            <a:r>
-              <a:rPr lang="en-US" altLang="zh-CN" dirty="0">
-                <a:solidFill>
-                  <a:schemeClr val="accent6">
-                    <a:lumMod val="75000"/>
-                  </a:schemeClr>
-                </a:solidFill>
-              </a:rPr>
-              <a:t>//</a:t>
-            </a:r>
-            <a:r>
-              <a:rPr lang="zh-CN" altLang="en-US" dirty="0">
-                <a:solidFill>
-                  <a:schemeClr val="accent6">
-                    <a:lumMod val="75000"/>
-                  </a:schemeClr>
-                </a:solidFill>
-              </a:rPr>
-              <a:t>为了放得下，压缩了行数，平时不要这样写</a:t>
-            </a:r>
-            <a:endParaRPr lang="en-US" altLang="zh-CN" dirty="0"/>
-          </a:p>
-          <a:p>
-            <a:endParaRPr lang="zh-CN" altLang="en-US" dirty="0"/>
-          </a:p>
-        </p:txBody>
-      </p:sp>
-    </p:spTree>
-    <p:extLst>
-      <p:ext uri="{BB962C8B-B14F-4D97-AF65-F5344CB8AC3E}">
-        <p14:creationId xmlns:p14="http://schemas.microsoft.com/office/powerpoint/2010/main" val="3665131684"/>
-      </p:ext>
-    </p:extLst>
-  </p:cSld>
-  <p:clrMapOvr>
-    <a:masterClrMapping/>
-  </p:clrMapOvr>
-</p:sld>
-</file>
-
 <file path=ppt/slides/slide13.xml><?xml version="1.0" encoding="utf-8"?>
 <p:sld xmlns:a="http://schemas.openxmlformats.org/drawingml/2006/main" xmlns:r="http://schemas.openxmlformats.org/officeDocument/2006/relationships" xmlns:p="http://schemas.openxmlformats.org/presentationml/2006/main">
   <p:cSld>
@@ -4235,7 +3730,7 @@
           <p:cNvPr id="2" name="标题 1">
             <a:extLst>
               <a:ext uri="{FF2B5EF4-FFF2-40B4-BE49-F238E27FC236}">
-                <a16:creationId xmlns:a16="http://schemas.microsoft.com/office/drawing/2014/main" id="{B53EEAEB-CE81-4721-9D40-45B1E972EC11}"/>
+                <a16:creationId xmlns:a16="http://schemas.microsoft.com/office/drawing/2014/main" id="{5333D4E9-A686-4EBD-8258-4FF101B88FF1}"/>
               </a:ext>
             </a:extLst>
           </p:cNvPr>
@@ -4253,38 +3748,56 @@
           <a:p>
             <a:r>
               <a:rPr lang="zh-CN" altLang="en-US" dirty="0"/>
-              <a:t>查询</a:t>
-            </a:r>
-          </a:p>
-        </p:txBody>
-      </p:sp>
-      <p:sp>
-        <p:nvSpPr>
-          <p:cNvPr id="3" name="内容占位符 2">
+              <a:t>维护</a:t>
+            </a:r>
+          </a:p>
+        </p:txBody>
+      </p:sp>
+      <p:sp>
+        <p:nvSpPr>
+          <p:cNvPr id="5" name="文本框 4">
             <a:extLst>
               <a:ext uri="{FF2B5EF4-FFF2-40B4-BE49-F238E27FC236}">
-                <a16:creationId xmlns:a16="http://schemas.microsoft.com/office/drawing/2014/main" id="{6056DAEC-F6AD-468B-8BC8-40C66CD43F3B}"/>
+                <a16:creationId xmlns:a16="http://schemas.microsoft.com/office/drawing/2014/main" id="{394D2450-17FE-459B-85AD-10FF5376C628}"/>
               </a:ext>
             </a:extLst>
           </p:cNvPr>
-          <p:cNvSpPr>
-            <a:spLocks noGrp="1"/>
-          </p:cNvSpPr>
-          <p:nvPr>
-            <p:ph idx="1"/>
-          </p:nvPr>
-        </p:nvSpPr>
-        <p:spPr/>
-        <p:txBody>
-          <a:bodyPr/>
-          <a:lstStyle/>
-          <a:p>
-            <a:pPr marL="0" indent="0">
-              <a:buNone/>
-            </a:pPr>
-            <a:r>
-              <a:rPr lang="en-US" altLang="zh-CN" dirty="0"/>
-              <a:t>    template&lt;class T&gt;T </a:t>
+          <p:cNvSpPr txBox="1"/>
+          <p:nvPr/>
+        </p:nvSpPr>
+        <p:spPr>
+          <a:xfrm>
+            <a:off x="914400" y="1257300"/>
+            <a:ext cx="7405688" cy="5355312"/>
+          </a:xfrm>
+          <a:prstGeom prst="rect">
+            <a:avLst/>
+          </a:prstGeom>
+          <a:noFill/>
+        </p:spPr>
+        <p:txBody>
+          <a:bodyPr wrap="square" rtlCol="0">
+            <a:spAutoFit/>
+          </a:bodyPr>
+          <a:lstStyle/>
+          <a:p>
+            <a:r>
+              <a:rPr lang="en-US" altLang="zh-CN" dirty="0"/>
+              <a:t>    template&lt;class </a:t>
+            </a:r>
+            <a:r>
+              <a:rPr lang="en-US" altLang="zh-CN" dirty="0">
+                <a:solidFill>
+                  <a:schemeClr val="accent4">
+                    <a:lumMod val="75000"/>
+                  </a:schemeClr>
+                </a:solidFill>
+              </a:rPr>
+              <a:t>T</a:t>
+            </a:r>
+            <a:r>
+              <a:rPr lang="en-US" altLang="zh-CN" dirty="0"/>
+              <a:t>&gt;void </a:t>
             </a:r>
             <a:r>
               <a:rPr lang="en-US" altLang="zh-CN" dirty="0" err="1">
@@ -4298,7 +3811,91 @@
             </a:r>
             <a:r>
               <a:rPr lang="en-US" altLang="zh-CN" dirty="0"/>
-              <a:t>&lt;T&gt;::top(</a:t>
+              <a:t>&lt;</a:t>
+            </a:r>
+            <a:r>
+              <a:rPr lang="en-US" altLang="zh-CN" dirty="0">
+                <a:solidFill>
+                  <a:schemeClr val="accent4">
+                    <a:lumMod val="75000"/>
+                  </a:schemeClr>
+                </a:solidFill>
+              </a:rPr>
+              <a:t>T</a:t>
+            </a:r>
+            <a:r>
+              <a:rPr lang="en-US" altLang="zh-CN" dirty="0"/>
+              <a:t>&gt;::</a:t>
+            </a:r>
+            <a:r>
+              <a:rPr lang="en-US" altLang="zh-CN" dirty="0" err="1">
+                <a:solidFill>
+                  <a:schemeClr val="accent6">
+                    <a:lumMod val="50000"/>
+                  </a:schemeClr>
+                </a:solidFill>
+              </a:rPr>
+              <a:t>matainHeap</a:t>
+            </a:r>
+            <a:r>
+              <a:rPr lang="en-US" altLang="zh-CN" dirty="0"/>
+              <a:t>(</a:t>
+            </a:r>
+            <a:r>
+              <a:rPr lang="en-US" altLang="zh-CN" dirty="0" err="1">
+                <a:solidFill>
+                  <a:schemeClr val="accent4">
+                    <a:lumMod val="75000"/>
+                  </a:schemeClr>
+                </a:solidFill>
+              </a:rPr>
+              <a:t>size_t</a:t>
+            </a:r>
+            <a:r>
+              <a:rPr lang="en-US" altLang="zh-CN" dirty="0">
+                <a:solidFill>
+                  <a:schemeClr val="accent4">
+                    <a:lumMod val="75000"/>
+                  </a:schemeClr>
+                </a:solidFill>
+              </a:rPr>
+              <a:t> </a:t>
+            </a:r>
+            <a:r>
+              <a:rPr lang="en-US" altLang="zh-CN" dirty="0"/>
+              <a:t>target)</a:t>
+            </a:r>
+          </a:p>
+          <a:p>
+            <a:r>
+              <a:rPr lang="en-US" altLang="zh-CN" dirty="0"/>
+              <a:t>    {</a:t>
+            </a:r>
+          </a:p>
+          <a:p>
+            <a:r>
+              <a:rPr lang="en-US" altLang="zh-CN" dirty="0"/>
+              <a:t>        </a:t>
+            </a:r>
+            <a:r>
+              <a:rPr lang="en-US" altLang="zh-CN" dirty="0" err="1">
+                <a:solidFill>
+                  <a:schemeClr val="accent4">
+                    <a:lumMod val="75000"/>
+                  </a:schemeClr>
+                </a:solidFill>
+              </a:rPr>
+              <a:t>size_t</a:t>
+            </a:r>
+            <a:r>
+              <a:rPr lang="en-US" altLang="zh-CN" dirty="0"/>
+              <a:t> next = target;</a:t>
+            </a:r>
+          </a:p>
+          <a:p>
+            <a:r>
+              <a:rPr lang="en-US" altLang="zh-CN" dirty="0"/>
+              <a:t>        </a:t>
             </a:r>
             <a:r>
               <a:rPr lang="en-US" altLang="zh-CN" dirty="0">
@@ -4308,11 +3905,38 @@
                   </a:schemeClr>
                 </a:solidFill>
               </a:rPr>
-              <a:t>void</a:t>
-            </a:r>
-            <a:r>
-              <a:rPr lang="en-US" altLang="zh-CN" dirty="0"/>
-              <a:t>) </a:t>
+              <a:t>while</a:t>
+            </a:r>
+            <a:r>
+              <a:rPr lang="en-US" altLang="zh-CN" dirty="0"/>
+              <a:t> (</a:t>
+            </a:r>
+            <a:r>
+              <a:rPr lang="en-US" altLang="zh-CN" dirty="0">
+                <a:solidFill>
+                  <a:srgbClr val="0070C0"/>
+                </a:solidFill>
+              </a:rPr>
+              <a:t>true</a:t>
+            </a:r>
+            <a:r>
+              <a:rPr lang="en-US" altLang="zh-CN" dirty="0"/>
+              <a:t>)</a:t>
+            </a:r>
+          </a:p>
+          <a:p>
+            <a:r>
+              <a:rPr lang="en-US" altLang="zh-CN" dirty="0"/>
+              <a:t>        {</a:t>
+            </a:r>
+          </a:p>
+          <a:p>
+            <a:br>
+              <a:rPr lang="en-US" altLang="zh-CN" dirty="0"/>
+            </a:br>
+            <a:r>
+              <a:rPr lang="en-US" altLang="zh-CN" dirty="0"/>
+              <a:t>            </a:t>
             </a:r>
             <a:r>
               <a:rPr lang="en-US" altLang="zh-CN" dirty="0">
@@ -4322,25 +3946,51 @@
                   </a:schemeClr>
                 </a:solidFill>
               </a:rPr>
-              <a:t>const</a:t>
-            </a:r>
-          </a:p>
-          <a:p>
-            <a:pPr marL="0" indent="0">
-              <a:buNone/>
-            </a:pPr>
-            <a:r>
-              <a:rPr lang="en-US" altLang="zh-CN" dirty="0"/>
-              <a:t>    {</a:t>
-            </a:r>
-          </a:p>
-          <a:p>
-            <a:pPr marL="0" indent="0">
-              <a:buNone/>
-            </a:pPr>
-            <a:r>
-              <a:rPr lang="en-US" altLang="zh-CN" dirty="0"/>
-              <a:t>        </a:t>
+              <a:t>if</a:t>
+            </a:r>
+            <a:r>
+              <a:rPr lang="en-US" altLang="zh-CN" dirty="0"/>
+              <a:t> (Heap[target] &lt; Heap[</a:t>
+            </a:r>
+            <a:r>
+              <a:rPr lang="en-US" altLang="zh-CN" dirty="0">
+                <a:solidFill>
+                  <a:schemeClr val="accent6">
+                    <a:lumMod val="50000"/>
+                  </a:schemeClr>
+                </a:solidFill>
+              </a:rPr>
+              <a:t>left</a:t>
+            </a:r>
+            <a:r>
+              <a:rPr lang="en-US" altLang="zh-CN" dirty="0"/>
+              <a:t>(target)])</a:t>
+            </a:r>
+          </a:p>
+          <a:p>
+            <a:r>
+              <a:rPr lang="en-US" altLang="zh-CN" dirty="0"/>
+              <a:t>            {next = </a:t>
+            </a:r>
+            <a:r>
+              <a:rPr lang="en-US" altLang="zh-CN" dirty="0">
+                <a:solidFill>
+                  <a:schemeClr val="accent6">
+                    <a:lumMod val="50000"/>
+                  </a:schemeClr>
+                </a:solidFill>
+              </a:rPr>
+              <a:t>left</a:t>
+            </a:r>
+            <a:r>
+              <a:rPr lang="en-US" altLang="zh-CN" dirty="0"/>
+              <a:t>(target);}</a:t>
+            </a:r>
+          </a:p>
+          <a:p>
+            <a:r>
+              <a:rPr lang="en-US" altLang="zh-CN" dirty="0"/>
+              <a:t>            </a:t>
             </a:r>
             <a:r>
               <a:rPr lang="en-US" altLang="zh-CN" dirty="0">
@@ -4350,34 +4000,302 @@
                   </a:schemeClr>
                 </a:solidFill>
               </a:rPr>
+              <a:t>else</a:t>
+            </a:r>
+            <a:r>
+              <a:rPr lang="en-US" altLang="zh-CN" dirty="0"/>
+              <a:t> </a:t>
+            </a:r>
+            <a:r>
+              <a:rPr lang="en-US" altLang="zh-CN" dirty="0">
+                <a:solidFill>
+                  <a:schemeClr val="accent2">
+                    <a:lumMod val="75000"/>
+                  </a:schemeClr>
+                </a:solidFill>
+              </a:rPr>
+              <a:t>if</a:t>
+            </a:r>
+            <a:r>
+              <a:rPr lang="en-US" altLang="zh-CN" dirty="0"/>
+              <a:t> (Heap[next] &lt; Heap[</a:t>
+            </a:r>
+            <a:r>
+              <a:rPr lang="en-US" altLang="zh-CN" dirty="0">
+                <a:solidFill>
+                  <a:schemeClr val="accent6">
+                    <a:lumMod val="50000"/>
+                  </a:schemeClr>
+                </a:solidFill>
+              </a:rPr>
+              <a:t>right</a:t>
+            </a:r>
+            <a:r>
+              <a:rPr lang="en-US" altLang="zh-CN" dirty="0"/>
+              <a:t>(target)])</a:t>
+            </a:r>
+          </a:p>
+          <a:p>
+            <a:r>
+              <a:rPr lang="en-US" altLang="zh-CN" dirty="0"/>
+              <a:t>            {next = </a:t>
+            </a:r>
+            <a:r>
+              <a:rPr lang="en-US" altLang="zh-CN" dirty="0">
+                <a:solidFill>
+                  <a:schemeClr val="accent6">
+                    <a:lumMod val="50000"/>
+                  </a:schemeClr>
+                </a:solidFill>
+              </a:rPr>
+              <a:t>right</a:t>
+            </a:r>
+            <a:r>
+              <a:rPr lang="en-US" altLang="zh-CN" dirty="0"/>
+              <a:t>(target);}</a:t>
+            </a:r>
+            <a:r>
+              <a:rPr lang="en-US" altLang="zh-CN" dirty="0">
+                <a:solidFill>
+                  <a:schemeClr val="accent6">
+                    <a:lumMod val="75000"/>
+                  </a:schemeClr>
+                </a:solidFill>
+              </a:rPr>
+              <a:t>//</a:t>
+            </a:r>
+            <a:r>
+              <a:rPr lang="zh-CN" altLang="en-US" dirty="0">
+                <a:solidFill>
+                  <a:schemeClr val="accent6">
+                    <a:lumMod val="75000"/>
+                  </a:schemeClr>
+                </a:solidFill>
+              </a:rPr>
+              <a:t>找到父节点和子节点中比较大的那个</a:t>
+            </a:r>
+          </a:p>
+          <a:p>
+            <a:r>
+              <a:rPr lang="zh-CN" altLang="en-US" dirty="0"/>
+              <a:t>            </a:t>
+            </a:r>
+            <a:r>
+              <a:rPr lang="en-US" altLang="zh-CN" dirty="0">
+                <a:solidFill>
+                  <a:schemeClr val="accent2">
+                    <a:lumMod val="75000"/>
+                  </a:schemeClr>
+                </a:solidFill>
+              </a:rPr>
+              <a:t>if</a:t>
+            </a:r>
+            <a:r>
+              <a:rPr lang="en-US" altLang="zh-CN" dirty="0"/>
+              <a:t> (next != target)</a:t>
+            </a:r>
+            <a:r>
+              <a:rPr lang="en-US" altLang="zh-CN" dirty="0">
+                <a:solidFill>
+                  <a:schemeClr val="accent6">
+                    <a:lumMod val="75000"/>
+                  </a:schemeClr>
+                </a:solidFill>
+              </a:rPr>
+              <a:t>//</a:t>
+            </a:r>
+            <a:r>
+              <a:rPr lang="zh-CN" altLang="en-US" dirty="0">
+                <a:solidFill>
+                  <a:schemeClr val="accent6">
+                    <a:lumMod val="75000"/>
+                  </a:schemeClr>
+                </a:solidFill>
+              </a:rPr>
+              <a:t>如果不是父节点就交换</a:t>
+            </a:r>
+          </a:p>
+          <a:p>
+            <a:r>
+              <a:rPr lang="zh-CN" altLang="en-US" dirty="0"/>
+              <a:t>            </a:t>
+            </a:r>
+            <a:r>
+              <a:rPr lang="en-US" altLang="zh-CN" dirty="0"/>
+              <a:t>{</a:t>
+            </a:r>
+          </a:p>
+          <a:p>
+            <a:r>
+              <a:rPr lang="en-US" altLang="zh-CN" dirty="0"/>
+              <a:t>                </a:t>
+            </a:r>
+            <a:r>
+              <a:rPr lang="en-US" altLang="zh-CN" dirty="0">
+                <a:solidFill>
+                  <a:schemeClr val="accent6">
+                    <a:lumMod val="60000"/>
+                    <a:lumOff val="40000"/>
+                  </a:schemeClr>
+                </a:solidFill>
+              </a:rPr>
+              <a:t>std</a:t>
+            </a:r>
+            <a:r>
+              <a:rPr lang="en-US" altLang="zh-CN" dirty="0"/>
+              <a:t>::</a:t>
+            </a:r>
+            <a:r>
+              <a:rPr lang="en-US" altLang="zh-CN" dirty="0">
+                <a:solidFill>
+                  <a:schemeClr val="accent6">
+                    <a:lumMod val="50000"/>
+                  </a:schemeClr>
+                </a:solidFill>
+              </a:rPr>
+              <a:t>swap</a:t>
+            </a:r>
+            <a:r>
+              <a:rPr lang="en-US" altLang="zh-CN" dirty="0"/>
+              <a:t>(Heap[next], Heap[target]);</a:t>
+            </a:r>
+          </a:p>
+          <a:p>
+            <a:r>
+              <a:rPr lang="en-US" altLang="zh-CN" dirty="0"/>
+              <a:t>                target = next;</a:t>
+            </a:r>
+          </a:p>
+          <a:p>
+            <a:r>
+              <a:rPr lang="en-US" altLang="zh-CN" dirty="0"/>
+              <a:t>            }</a:t>
+            </a:r>
+          </a:p>
+          <a:p>
+            <a:r>
+              <a:rPr lang="en-US" altLang="zh-CN" dirty="0"/>
+              <a:t>            </a:t>
+            </a:r>
+            <a:r>
+              <a:rPr lang="en-US" altLang="zh-CN" dirty="0">
+                <a:solidFill>
+                  <a:schemeClr val="accent2">
+                    <a:lumMod val="75000"/>
+                  </a:schemeClr>
+                </a:solidFill>
+              </a:rPr>
+              <a:t>else</a:t>
+            </a:r>
+            <a:r>
+              <a:rPr lang="en-US" altLang="zh-CN" dirty="0"/>
+              <a:t>{</a:t>
+            </a:r>
+            <a:r>
+              <a:rPr lang="en-US" altLang="zh-CN" dirty="0">
+                <a:solidFill>
+                  <a:schemeClr val="accent5">
+                    <a:lumMod val="75000"/>
+                  </a:schemeClr>
+                </a:solidFill>
+              </a:rPr>
               <a:t>return</a:t>
             </a:r>
             <a:r>
               <a:rPr lang="en-US" altLang="zh-CN" dirty="0"/>
-              <a:t> Heap[0];</a:t>
-            </a:r>
-          </a:p>
-          <a:p>
-            <a:pPr marL="0" indent="0">
-              <a:buNone/>
-            </a:pPr>
-            <a:r>
-              <a:rPr lang="en-US" altLang="zh-CN" dirty="0"/>
-              <a:t>    }</a:t>
+              <a:t>;}</a:t>
+            </a:r>
+            <a:r>
+              <a:rPr lang="en-US" altLang="zh-CN" dirty="0">
+                <a:solidFill>
+                  <a:schemeClr val="accent6">
+                    <a:lumMod val="75000"/>
+                  </a:schemeClr>
+                </a:solidFill>
+              </a:rPr>
+              <a:t>//</a:t>
+            </a:r>
+            <a:r>
+              <a:rPr lang="zh-CN" altLang="en-US" dirty="0">
+                <a:solidFill>
+                  <a:schemeClr val="accent6">
+                    <a:lumMod val="75000"/>
+                  </a:schemeClr>
+                </a:solidFill>
+              </a:rPr>
+              <a:t>是则说明这个节点满足性质，可以收工了</a:t>
             </a:r>
           </a:p>
           <a:p>
             <a:r>
               <a:rPr lang="zh-CN" altLang="en-US" dirty="0"/>
-              <a:t>直接返回堆顶（树根）元素</a:t>
-            </a:r>
+              <a:t>        </a:t>
+            </a:r>
+            <a:r>
+              <a:rPr lang="en-US" altLang="zh-CN" dirty="0"/>
+              <a:t>}</a:t>
+            </a:r>
+            <a:r>
+              <a:rPr lang="en-US" altLang="zh-CN" dirty="0">
+                <a:solidFill>
+                  <a:schemeClr val="accent6">
+                    <a:lumMod val="75000"/>
+                  </a:schemeClr>
+                </a:solidFill>
+              </a:rPr>
+              <a:t>//</a:t>
+            </a:r>
+            <a:r>
+              <a:rPr lang="zh-CN" altLang="en-US" dirty="0">
+                <a:solidFill>
+                  <a:schemeClr val="accent6">
+                    <a:lumMod val="75000"/>
+                  </a:schemeClr>
+                </a:solidFill>
+              </a:rPr>
+              <a:t>继续维护性质</a:t>
+            </a:r>
+          </a:p>
+          <a:p>
+            <a:r>
+              <a:rPr lang="zh-CN" altLang="en-US" dirty="0"/>
+              <a:t>    </a:t>
+            </a:r>
+            <a:r>
+              <a:rPr lang="en-US" altLang="zh-CN" dirty="0"/>
+              <a:t>}</a:t>
+            </a:r>
+            <a:r>
+              <a:rPr lang="en-US" altLang="zh-CN" dirty="0">
+                <a:solidFill>
+                  <a:schemeClr val="accent6">
+                    <a:lumMod val="75000"/>
+                  </a:schemeClr>
+                </a:solidFill>
+              </a:rPr>
+              <a:t>//</a:t>
+            </a:r>
+            <a:r>
+              <a:rPr lang="zh-CN" altLang="en-US" dirty="0">
+                <a:solidFill>
+                  <a:schemeClr val="accent6">
+                    <a:lumMod val="75000"/>
+                  </a:schemeClr>
+                </a:solidFill>
+              </a:rPr>
+              <a:t>为了放得下，压缩了行数，平时不要这样写</a:t>
+            </a:r>
+            <a:endParaRPr lang="en-US" altLang="zh-CN" dirty="0"/>
+          </a:p>
+          <a:p>
+            <a:endParaRPr lang="zh-CN" altLang="en-US" dirty="0"/>
           </a:p>
         </p:txBody>
       </p:sp>
     </p:spTree>
     <p:extLst>
       <p:ext uri="{BB962C8B-B14F-4D97-AF65-F5344CB8AC3E}">
-        <p14:creationId xmlns:p14="http://schemas.microsoft.com/office/powerpoint/2010/main" val="591239542"/>
+        <p14:creationId xmlns:p14="http://schemas.microsoft.com/office/powerpoint/2010/main" val="3665131684"/>
       </p:ext>
     </p:extLst>
   </p:cSld>
@@ -4409,7 +4327,7 @@
           <p:cNvPr id="2" name="标题 1">
             <a:extLst>
               <a:ext uri="{FF2B5EF4-FFF2-40B4-BE49-F238E27FC236}">
-                <a16:creationId xmlns:a16="http://schemas.microsoft.com/office/drawing/2014/main" id="{875BA6DF-3938-4F32-89E9-A8C7A2C5670A}"/>
+                <a16:creationId xmlns:a16="http://schemas.microsoft.com/office/drawing/2014/main" id="{B53EEAEB-CE81-4721-9D40-45B1E972EC11}"/>
               </a:ext>
             </a:extLst>
           </p:cNvPr>
@@ -4427,7 +4345,7 @@
           <a:p>
             <a:r>
               <a:rPr lang="zh-CN" altLang="en-US" dirty="0"/>
-              <a:t>插入</a:t>
+              <a:t>查询</a:t>
             </a:r>
           </a:p>
         </p:txBody>
@@ -4437,7 +4355,7 @@
           <p:cNvPr id="3" name="内容占位符 2">
             <a:extLst>
               <a:ext uri="{FF2B5EF4-FFF2-40B4-BE49-F238E27FC236}">
-                <a16:creationId xmlns:a16="http://schemas.microsoft.com/office/drawing/2014/main" id="{1AD4D09B-997D-4306-8CCE-EF11D4B81C12}"/>
+                <a16:creationId xmlns:a16="http://schemas.microsoft.com/office/drawing/2014/main" id="{6056DAEC-F6AD-468B-8BC8-40C66CD43F3B}"/>
               </a:ext>
             </a:extLst>
           </p:cNvPr>
@@ -4448,16 +4366,9 @@
             <p:ph idx="1"/>
           </p:nvPr>
         </p:nvSpPr>
-        <p:spPr>
-          <a:xfrm>
-            <a:off x="378618" y="1690689"/>
-            <a:ext cx="8386763" cy="4351338"/>
-          </a:xfrm>
-        </p:spPr>
-        <p:txBody>
-          <a:bodyPr>
-            <a:normAutofit/>
-          </a:bodyPr>
+        <p:spPr/>
+        <p:txBody>
+          <a:bodyPr/>
           <a:lstStyle/>
           <a:p>
             <a:pPr marL="0" indent="0">
@@ -4465,115 +4376,78 @@
             </a:pPr>
             <a:r>
               <a:rPr lang="en-US" altLang="zh-CN" dirty="0"/>
-              <a:t>    template&lt;class T&gt;void </a:t>
-            </a:r>
-            <a:r>
-              <a:rPr lang="en-US" altLang="zh-CN" dirty="0" err="1"/>
-              <a:t>P_Queue</a:t>
-            </a:r>
-            <a:r>
-              <a:rPr lang="en-US" altLang="zh-CN" dirty="0"/>
-              <a:t>&lt;T&gt;::insert(const T&amp; target)</a:t>
-            </a:r>
-          </a:p>
-          <a:p>
-            <a:pPr marL="0" indent="0">
-              <a:buNone/>
-            </a:pPr>
-            <a:r>
-              <a:rPr lang="en-US" altLang="zh-CN" dirty="0"/>
-              <a:t>    {</a:t>
-            </a:r>
-          </a:p>
-          <a:p>
-            <a:pPr marL="0" indent="0">
-              <a:buNone/>
-            </a:pPr>
-            <a:r>
-              <a:rPr lang="en-US" altLang="zh-CN" dirty="0"/>
-              <a:t>        Heap[</a:t>
-            </a:r>
-            <a:r>
-              <a:rPr lang="en-US" altLang="zh-CN" dirty="0" err="1"/>
-              <a:t>compacityUsed</a:t>
-            </a:r>
-            <a:r>
-              <a:rPr lang="en-US" altLang="zh-CN" dirty="0"/>
-              <a:t>] = target;</a:t>
-            </a:r>
-            <a:r>
-              <a:rPr lang="en-US" altLang="zh-CN" dirty="0">
+              <a:t>    template&lt;class T&gt;T </a:t>
+            </a:r>
+            <a:r>
+              <a:rPr lang="en-US" altLang="zh-CN" dirty="0" err="1">
                 <a:solidFill>
-                  <a:schemeClr val="accent6">
+                  <a:schemeClr val="accent4">
                     <a:lumMod val="75000"/>
                   </a:schemeClr>
                 </a:solidFill>
               </a:rPr>
-              <a:t>//</a:t>
-            </a:r>
-            <a:r>
-              <a:rPr lang="zh-CN" altLang="en-US" dirty="0">
+              <a:t>P_Queue</a:t>
+            </a:r>
+            <a:r>
+              <a:rPr lang="en-US" altLang="zh-CN" dirty="0"/>
+              <a:t>&lt;T&gt;::top(</a:t>
+            </a:r>
+            <a:r>
+              <a:rPr lang="en-US" altLang="zh-CN" dirty="0">
                 <a:solidFill>
-                  <a:schemeClr val="accent6">
+                  <a:schemeClr val="accent2">
                     <a:lumMod val="75000"/>
                   </a:schemeClr>
                 </a:solidFill>
               </a:rPr>
-              <a:t>新元素插到底下</a:t>
-            </a:r>
-            <a:endParaRPr lang="en-US" altLang="zh-CN" dirty="0">
-              <a:solidFill>
-                <a:schemeClr val="accent6">
-                  <a:lumMod val="75000"/>
-                </a:schemeClr>
-              </a:solidFill>
-            </a:endParaRPr>
-          </a:p>
-          <a:p>
-            <a:pPr marL="0" indent="0">
-              <a:buNone/>
-            </a:pPr>
-            <a:r>
-              <a:rPr lang="en-US" altLang="zh-CN" dirty="0"/>
-              <a:t>        </a:t>
-            </a:r>
-            <a:r>
-              <a:rPr lang="en-US" altLang="zh-CN" dirty="0" err="1"/>
-              <a:t>matainHeap</a:t>
-            </a:r>
-            <a:r>
-              <a:rPr lang="en-US" altLang="zh-CN" dirty="0"/>
-              <a:t>(</a:t>
-            </a:r>
-            <a:r>
-              <a:rPr lang="en-US" altLang="zh-CN" dirty="0" err="1"/>
-              <a:t>compacityUsed</a:t>
-            </a:r>
-            <a:r>
-              <a:rPr lang="en-US" altLang="zh-CN" dirty="0"/>
-              <a:t>);</a:t>
+              <a:t>void</a:t>
+            </a:r>
+            <a:r>
+              <a:rPr lang="en-US" altLang="zh-CN" dirty="0"/>
+              <a:t>) </a:t>
             </a:r>
             <a:r>
               <a:rPr lang="en-US" altLang="zh-CN" dirty="0">
                 <a:solidFill>
-                  <a:schemeClr val="accent6">
+                  <a:schemeClr val="accent2">
                     <a:lumMod val="75000"/>
                   </a:schemeClr>
                 </a:solidFill>
               </a:rPr>
-              <a:t>//</a:t>
-            </a:r>
-            <a:r>
-              <a:rPr lang="zh-CN" altLang="en-US" dirty="0">
+              <a:t>const</a:t>
+            </a:r>
+          </a:p>
+          <a:p>
+            <a:pPr marL="0" indent="0">
+              <a:buNone/>
+            </a:pPr>
+            <a:r>
+              <a:rPr lang="en-US" altLang="zh-CN" dirty="0"/>
+              <a:t>    {</a:t>
+            </a:r>
+          </a:p>
+          <a:p>
+            <a:pPr marL="0" indent="0">
+              <a:buNone/>
+            </a:pPr>
+            <a:r>
+              <a:rPr lang="en-US" altLang="zh-CN" dirty="0"/>
+              <a:t>        </a:t>
+            </a:r>
+            <a:r>
+              <a:rPr lang="en-US" altLang="zh-CN" dirty="0">
                 <a:solidFill>
-                  <a:schemeClr val="accent6">
+                  <a:schemeClr val="accent2">
                     <a:lumMod val="75000"/>
                   </a:schemeClr>
                 </a:solidFill>
               </a:rPr>
-              <a:t>维护性质</a:t>
-            </a:r>
-            <a:endParaRPr lang="en-US" altLang="zh-CN" dirty="0"/>
+              <a:t>return</a:t>
+            </a:r>
+            <a:r>
+              <a:rPr lang="en-US" altLang="zh-CN" dirty="0"/>
+              <a:t> Heap[0];</a:t>
+            </a:r>
           </a:p>
           <a:p>
             <a:pPr marL="0" indent="0">
@@ -4581,59 +4455,21 @@
             </a:pPr>
             <a:r>
               <a:rPr lang="en-US" altLang="zh-CN" dirty="0"/>
-              <a:t>        ++</a:t>
-            </a:r>
-            <a:r>
-              <a:rPr lang="en-US" altLang="zh-CN" dirty="0" err="1"/>
-              <a:t>compacityUsed</a:t>
-            </a:r>
-            <a:r>
-              <a:rPr lang="en-US" altLang="zh-CN" dirty="0"/>
-              <a:t>;</a:t>
-            </a:r>
-            <a:r>
-              <a:rPr lang="en-US" altLang="zh-CN" dirty="0">
-                <a:solidFill>
-                  <a:schemeClr val="accent6">
-                    <a:lumMod val="75000"/>
-                  </a:schemeClr>
-                </a:solidFill>
-              </a:rPr>
-              <a:t>//</a:t>
-            </a:r>
-            <a:r>
-              <a:rPr lang="zh-CN" altLang="en-US" dirty="0">
-                <a:solidFill>
-                  <a:schemeClr val="accent6">
-                    <a:lumMod val="75000"/>
-                  </a:schemeClr>
-                </a:solidFill>
-              </a:rPr>
-              <a:t>更新堆的大小</a:t>
-            </a:r>
-            <a:endParaRPr lang="en-US" altLang="zh-CN" dirty="0"/>
-          </a:p>
-          <a:p>
-            <a:pPr marL="0" indent="0">
-              <a:buNone/>
-            </a:pPr>
-            <a:r>
-              <a:rPr lang="en-US" altLang="zh-CN" dirty="0"/>
               <a:t>    }</a:t>
             </a:r>
           </a:p>
           <a:p>
-            <a:pPr marL="0" indent="0">
-              <a:buNone/>
-            </a:pPr>
-            <a:endParaRPr lang="zh-CN" altLang="en-US" dirty="0"/>
+            <a:r>
+              <a:rPr lang="zh-CN" altLang="en-US" dirty="0"/>
+              <a:t>直接返回堆顶（树根）元素</a:t>
+            </a:r>
           </a:p>
         </p:txBody>
       </p:sp>
     </p:spTree>
     <p:extLst>
       <p:ext uri="{BB962C8B-B14F-4D97-AF65-F5344CB8AC3E}">
-        <p14:creationId xmlns:p14="http://schemas.microsoft.com/office/powerpoint/2010/main" val="3585423874"/>
+        <p14:creationId xmlns:p14="http://schemas.microsoft.com/office/powerpoint/2010/main" val="591239542"/>
       </p:ext>
     </p:extLst>
   </p:cSld>
@@ -4665,7 +4501,7 @@
           <p:cNvPr id="2" name="标题 1">
             <a:extLst>
               <a:ext uri="{FF2B5EF4-FFF2-40B4-BE49-F238E27FC236}">
-                <a16:creationId xmlns:a16="http://schemas.microsoft.com/office/drawing/2014/main" id="{17688BEE-7B4E-4855-8592-DB72C627A1F5}"/>
+                <a16:creationId xmlns:a16="http://schemas.microsoft.com/office/drawing/2014/main" id="{875BA6DF-3938-4F32-89E9-A8C7A2C5670A}"/>
               </a:ext>
             </a:extLst>
           </p:cNvPr>
@@ -4683,7 +4519,7 @@
           <a:p>
             <a:r>
               <a:rPr lang="zh-CN" altLang="en-US" dirty="0"/>
-              <a:t>删除</a:t>
+              <a:t>插入</a:t>
             </a:r>
           </a:p>
         </p:txBody>
@@ -4693,7 +4529,7 @@
           <p:cNvPr id="3" name="内容占位符 2">
             <a:extLst>
               <a:ext uri="{FF2B5EF4-FFF2-40B4-BE49-F238E27FC236}">
-                <a16:creationId xmlns:a16="http://schemas.microsoft.com/office/drawing/2014/main" id="{5A4E4457-9E66-41C3-AD6F-F184E00E866D}"/>
+                <a16:creationId xmlns:a16="http://schemas.microsoft.com/office/drawing/2014/main" id="{1AD4D09B-997D-4306-8CCE-EF11D4B81C12}"/>
               </a:ext>
             </a:extLst>
           </p:cNvPr>
@@ -4704,9 +4540,16 @@
             <p:ph idx="1"/>
           </p:nvPr>
         </p:nvSpPr>
-        <p:spPr/>
-        <p:txBody>
-          <a:bodyPr/>
+        <p:spPr>
+          <a:xfrm>
+            <a:off x="378618" y="1690689"/>
+            <a:ext cx="8386763" cy="4351338"/>
+          </a:xfrm>
+        </p:spPr>
+        <p:txBody>
+          <a:bodyPr>
+            <a:normAutofit/>
+          </a:bodyPr>
           <a:lstStyle/>
           <a:p>
             <a:pPr marL="0" indent="0">
@@ -4722,7 +4565,7 @@
             </a:r>
             <a:r>
               <a:rPr lang="en-US" altLang="zh-CN" dirty="0"/>
-              <a:t>&lt;T&gt;::pop(void)</a:t>
+              <a:t>&lt;T&gt;::insert(const T&amp; target)</a:t>
             </a:r>
           </a:p>
           <a:p>
@@ -4740,7 +4583,7 @@
             </a:pPr>
             <a:r>
               <a:rPr lang="en-US" altLang="zh-CN" dirty="0"/>
-              <a:t>        std::swap(Heap[0], Heap[</a:t>
+              <a:t>        Heap[</a:t>
             </a:r>
             <a:r>
               <a:rPr lang="en-US" altLang="zh-CN" dirty="0" err="1"/>
@@ -4748,8 +4591,35 @@
             </a:r>
             <a:r>
               <a:rPr lang="en-US" altLang="zh-CN" dirty="0"/>
-              <a:t> - 1]);</a:t>
-            </a:r>
+              <a:t>] = target;</a:t>
+            </a:r>
+            <a:r>
+              <a:rPr lang="en-US" altLang="zh-CN" dirty="0">
+                <a:solidFill>
+                  <a:schemeClr val="accent6">
+                    <a:lumMod val="75000"/>
+                  </a:schemeClr>
+                </a:solidFill>
+              </a:rPr>
+              <a:t>//</a:t>
+            </a:r>
+            <a:r>
+              <a:rPr lang="zh-CN" altLang="en-US" dirty="0">
+                <a:solidFill>
+                  <a:schemeClr val="accent6">
+                    <a:lumMod val="75000"/>
+                  </a:schemeClr>
+                </a:solidFill>
+              </a:rPr>
+              <a:t>新元素插到底下</a:t>
+            </a:r>
+            <a:endParaRPr lang="en-US" altLang="zh-CN" dirty="0">
+              <a:solidFill>
+                <a:schemeClr val="accent6">
+                  <a:lumMod val="75000"/>
+                </a:schemeClr>
+              </a:solidFill>
+            </a:endParaRPr>
           </a:p>
           <a:p>
             <a:pPr marL="0" indent="0">
@@ -4757,7 +4627,15 @@
             </a:pPr>
             <a:r>
               <a:rPr lang="en-US" altLang="zh-CN" dirty="0"/>
-              <a:t>        --</a:t>
+              <a:t>        </a:t>
+            </a:r>
+            <a:r>
+              <a:rPr lang="en-US" altLang="zh-CN" dirty="0" err="1"/>
+              <a:t>matainHeap</a:t>
+            </a:r>
+            <a:r>
+              <a:rPr lang="en-US" altLang="zh-CN" dirty="0"/>
+              <a:t>(</a:t>
             </a:r>
             <a:r>
               <a:rPr lang="en-US" altLang="zh-CN" dirty="0" err="1"/>
@@ -4765,25 +4643,67 @@
             </a:r>
             <a:r>
               <a:rPr lang="en-US" altLang="zh-CN" dirty="0"/>
+              <a:t>);</a:t>
+            </a:r>
+            <a:r>
+              <a:rPr lang="en-US" altLang="zh-CN" dirty="0">
+                <a:solidFill>
+                  <a:schemeClr val="accent6">
+                    <a:lumMod val="75000"/>
+                  </a:schemeClr>
+                </a:solidFill>
+              </a:rPr>
+              <a:t>//</a:t>
+            </a:r>
+            <a:r>
+              <a:rPr lang="zh-CN" altLang="en-US" dirty="0">
+                <a:solidFill>
+                  <a:schemeClr val="accent6">
+                    <a:lumMod val="75000"/>
+                  </a:schemeClr>
+                </a:solidFill>
+              </a:rPr>
+              <a:t>维护性质</a:t>
+            </a:r>
+            <a:endParaRPr lang="en-US" altLang="zh-CN" dirty="0"/>
+          </a:p>
+          <a:p>
+            <a:pPr marL="0" indent="0">
+              <a:buNone/>
+            </a:pPr>
+            <a:r>
+              <a:rPr lang="en-US" altLang="zh-CN" dirty="0"/>
+              <a:t>        ++</a:t>
+            </a:r>
+            <a:r>
+              <a:rPr lang="en-US" altLang="zh-CN" dirty="0" err="1"/>
+              <a:t>compacityUsed</a:t>
+            </a:r>
+            <a:r>
+              <a:rPr lang="en-US" altLang="zh-CN" dirty="0"/>
               <a:t>;</a:t>
             </a:r>
-          </a:p>
-          <a:p>
-            <a:pPr marL="0" indent="0">
-              <a:buNone/>
-            </a:pPr>
-            <a:r>
-              <a:rPr lang="en-US" altLang="zh-CN" dirty="0"/>
-              <a:t>        </a:t>
-            </a:r>
-            <a:r>
-              <a:rPr lang="en-US" altLang="zh-CN" dirty="0" err="1"/>
-              <a:t>matainHeap</a:t>
-            </a:r>
-            <a:r>
-              <a:rPr lang="en-US" altLang="zh-CN" dirty="0"/>
-              <a:t>(0);</a:t>
-            </a:r>
+            <a:r>
+              <a:rPr lang="en-US" altLang="zh-CN" dirty="0">
+                <a:solidFill>
+                  <a:schemeClr val="accent6">
+                    <a:lumMod val="75000"/>
+                  </a:schemeClr>
+                </a:solidFill>
+              </a:rPr>
+              <a:t>//</a:t>
+            </a:r>
+            <a:r>
+              <a:rPr lang="zh-CN" altLang="en-US" dirty="0">
+                <a:solidFill>
+                  <a:schemeClr val="accent6">
+                    <a:lumMod val="75000"/>
+                  </a:schemeClr>
+                </a:solidFill>
+              </a:rPr>
+              <a:t>更新堆的大小</a:t>
+            </a:r>
+            <a:endParaRPr lang="en-US" altLang="zh-CN" dirty="0"/>
           </a:p>
           <a:p>
             <a:pPr marL="0" indent="0">
@@ -4805,7 +4725,7 @@
     </p:spTree>
     <p:extLst>
       <p:ext uri="{BB962C8B-B14F-4D97-AF65-F5344CB8AC3E}">
-        <p14:creationId xmlns:p14="http://schemas.microsoft.com/office/powerpoint/2010/main" val="1721349704"/>
+        <p14:creationId xmlns:p14="http://schemas.microsoft.com/office/powerpoint/2010/main" val="3585423874"/>
       </p:ext>
     </p:extLst>
   </p:cSld>
@@ -4837,6 +4757,178 @@
           <p:cNvPr id="2" name="标题 1">
             <a:extLst>
               <a:ext uri="{FF2B5EF4-FFF2-40B4-BE49-F238E27FC236}">
+                <a16:creationId xmlns:a16="http://schemas.microsoft.com/office/drawing/2014/main" id="{17688BEE-7B4E-4855-8592-DB72C627A1F5}"/>
+              </a:ext>
+            </a:extLst>
+          </p:cNvPr>
+          <p:cNvSpPr>
+            <a:spLocks noGrp="1"/>
+          </p:cNvSpPr>
+          <p:nvPr>
+            <p:ph type="title"/>
+          </p:nvPr>
+        </p:nvSpPr>
+        <p:spPr/>
+        <p:txBody>
+          <a:bodyPr/>
+          <a:lstStyle/>
+          <a:p>
+            <a:r>
+              <a:rPr lang="zh-CN" altLang="en-US" dirty="0"/>
+              <a:t>删除</a:t>
+            </a:r>
+          </a:p>
+        </p:txBody>
+      </p:sp>
+      <p:sp>
+        <p:nvSpPr>
+          <p:cNvPr id="3" name="内容占位符 2">
+            <a:extLst>
+              <a:ext uri="{FF2B5EF4-FFF2-40B4-BE49-F238E27FC236}">
+                <a16:creationId xmlns:a16="http://schemas.microsoft.com/office/drawing/2014/main" id="{5A4E4457-9E66-41C3-AD6F-F184E00E866D}"/>
+              </a:ext>
+            </a:extLst>
+          </p:cNvPr>
+          <p:cNvSpPr>
+            <a:spLocks noGrp="1"/>
+          </p:cNvSpPr>
+          <p:nvPr>
+            <p:ph idx="1"/>
+          </p:nvPr>
+        </p:nvSpPr>
+        <p:spPr/>
+        <p:txBody>
+          <a:bodyPr/>
+          <a:lstStyle/>
+          <a:p>
+            <a:pPr marL="0" indent="0">
+              <a:buNone/>
+            </a:pPr>
+            <a:r>
+              <a:rPr lang="en-US" altLang="zh-CN" dirty="0"/>
+              <a:t>    template&lt;class T&gt;void </a:t>
+            </a:r>
+            <a:r>
+              <a:rPr lang="en-US" altLang="zh-CN" dirty="0" err="1"/>
+              <a:t>P_Queue</a:t>
+            </a:r>
+            <a:r>
+              <a:rPr lang="en-US" altLang="zh-CN" dirty="0"/>
+              <a:t>&lt;T&gt;::pop(void)</a:t>
+            </a:r>
+          </a:p>
+          <a:p>
+            <a:pPr marL="0" indent="0">
+              <a:buNone/>
+            </a:pPr>
+            <a:r>
+              <a:rPr lang="en-US" altLang="zh-CN" dirty="0"/>
+              <a:t>    {</a:t>
+            </a:r>
+          </a:p>
+          <a:p>
+            <a:pPr marL="0" indent="0">
+              <a:buNone/>
+            </a:pPr>
+            <a:r>
+              <a:rPr lang="en-US" altLang="zh-CN" dirty="0"/>
+              <a:t>        std::swap(Heap[0], Heap[</a:t>
+            </a:r>
+            <a:r>
+              <a:rPr lang="en-US" altLang="zh-CN" dirty="0" err="1"/>
+              <a:t>compacityUsed</a:t>
+            </a:r>
+            <a:r>
+              <a:rPr lang="en-US" altLang="zh-CN" dirty="0"/>
+              <a:t> - 1]);</a:t>
+            </a:r>
+          </a:p>
+          <a:p>
+            <a:pPr marL="0" indent="0">
+              <a:buNone/>
+            </a:pPr>
+            <a:r>
+              <a:rPr lang="en-US" altLang="zh-CN" dirty="0"/>
+              <a:t>        --</a:t>
+            </a:r>
+            <a:r>
+              <a:rPr lang="en-US" altLang="zh-CN" dirty="0" err="1"/>
+              <a:t>compacityUsed</a:t>
+            </a:r>
+            <a:r>
+              <a:rPr lang="en-US" altLang="zh-CN" dirty="0"/>
+              <a:t>;</a:t>
+            </a:r>
+          </a:p>
+          <a:p>
+            <a:pPr marL="0" indent="0">
+              <a:buNone/>
+            </a:pPr>
+            <a:r>
+              <a:rPr lang="en-US" altLang="zh-CN" dirty="0"/>
+              <a:t>        </a:t>
+            </a:r>
+            <a:r>
+              <a:rPr lang="en-US" altLang="zh-CN" dirty="0" err="1"/>
+              <a:t>matainHeap</a:t>
+            </a:r>
+            <a:r>
+              <a:rPr lang="en-US" altLang="zh-CN" dirty="0"/>
+              <a:t>(0);</a:t>
+            </a:r>
+          </a:p>
+          <a:p>
+            <a:pPr marL="0" indent="0">
+              <a:buNone/>
+            </a:pPr>
+            <a:r>
+              <a:rPr lang="en-US" altLang="zh-CN" dirty="0"/>
+              <a:t>    }</a:t>
+            </a:r>
+          </a:p>
+          <a:p>
+            <a:pPr marL="0" indent="0">
+              <a:buNone/>
+            </a:pPr>
+            <a:endParaRPr lang="zh-CN" altLang="en-US" dirty="0"/>
+          </a:p>
+        </p:txBody>
+      </p:sp>
+    </p:spTree>
+    <p:extLst>
+      <p:ext uri="{BB962C8B-B14F-4D97-AF65-F5344CB8AC3E}">
+        <p14:creationId xmlns:p14="http://schemas.microsoft.com/office/powerpoint/2010/main" val="1721349704"/>
+      </p:ext>
+    </p:extLst>
+  </p:cSld>
+  <p:clrMapOvr>
+    <a:masterClrMapping/>
+  </p:clrMapOvr>
+</p:sld>
+</file>
+
+<file path=ppt/slides/slide17.xml><?xml version="1.0" encoding="utf-8"?>
+<p:sld xmlns:a="http://schemas.openxmlformats.org/drawingml/2006/main" xmlns:r="http://schemas.openxmlformats.org/officeDocument/2006/relationships" xmlns:p="http://schemas.openxmlformats.org/presentationml/2006/main">
+  <p:cSld>
+    <p:spTree>
+      <p:nvGrpSpPr>
+        <p:cNvPr id="1" name=""/>
+        <p:cNvGrpSpPr/>
+        <p:nvPr/>
+      </p:nvGrpSpPr>
+      <p:grpSpPr>
+        <a:xfrm>
+          <a:off x="0" y="0"/>
+          <a:ext cx="0" cy="0"/>
+          <a:chOff x="0" y="0"/>
+          <a:chExt cx="0" cy="0"/>
+        </a:xfrm>
+      </p:grpSpPr>
+      <p:sp>
+        <p:nvSpPr>
+          <p:cNvPr id="2" name="标题 1">
+            <a:extLst>
+              <a:ext uri="{FF2B5EF4-FFF2-40B4-BE49-F238E27FC236}">
                 <a16:creationId xmlns:a16="http://schemas.microsoft.com/office/drawing/2014/main" id="{241854A0-E8B5-43F5-A0DF-EBA0EF7E1470}"/>
               </a:ext>
             </a:extLst>
@@ -4860,8 +4952,8 @@
           </a:p>
         </p:txBody>
       </p:sp>
-      <mc:AlternateContent xmlns:mc="http://schemas.openxmlformats.org/markup-compatibility/2006">
-        <mc:Choice xmlns:a14="http://schemas.microsoft.com/office/drawing/2010/main" Requires="a14">
+      <mc:AlternateContent xmlns:mc="http://schemas.openxmlformats.org/markup-compatibility/2006" xmlns:a14="http://schemas.microsoft.com/office/drawing/2010/main">
+        <mc:Choice Requires="a14">
           <p:sp>
             <p:nvSpPr>
               <p:cNvPr id="3" name="内容占位符 2">
@@ -4997,7 +5089,7 @@
             </p:txBody>
           </p:sp>
         </mc:Choice>
-        <mc:Fallback>
+        <mc:Fallback xmlns="">
           <p:sp>
             <p:nvSpPr>
               <p:cNvPr id="3" name="内容占位符 2">
@@ -5050,7 +5142,7 @@
 </p:sld>
 </file>
 
-<file path=ppt/slides/slide17.xml><?xml version="1.0" encoding="utf-8"?>
+<file path=ppt/slides/slide18.xml><?xml version="1.0" encoding="utf-8"?>
 <p:sld xmlns:a="http://schemas.openxmlformats.org/drawingml/2006/main" xmlns:r="http://schemas.openxmlformats.org/officeDocument/2006/relationships" xmlns:p="http://schemas.openxmlformats.org/presentationml/2006/main">
   <p:cSld>
     <p:spTree>
@@ -5221,6 +5313,176 @@
     <p:extLst>
       <p:ext uri="{BB962C8B-B14F-4D97-AF65-F5344CB8AC3E}">
         <p14:creationId xmlns:p14="http://schemas.microsoft.com/office/powerpoint/2010/main" val="4032163565"/>
+      </p:ext>
+    </p:extLst>
+  </p:cSld>
+  <p:clrMapOvr>
+    <a:masterClrMapping/>
+  </p:clrMapOvr>
+</p:sld>
+</file>
+
+<file path=ppt/slides/slide19.xml><?xml version="1.0" encoding="utf-8"?>
+<p:sld xmlns:a="http://schemas.openxmlformats.org/drawingml/2006/main" xmlns:r="http://schemas.openxmlformats.org/officeDocument/2006/relationships" xmlns:p="http://schemas.openxmlformats.org/presentationml/2006/main">
+  <p:cSld>
+    <p:spTree>
+      <p:nvGrpSpPr>
+        <p:cNvPr id="1" name=""/>
+        <p:cNvGrpSpPr/>
+        <p:nvPr/>
+      </p:nvGrpSpPr>
+      <p:grpSpPr>
+        <a:xfrm>
+          <a:off x="0" y="0"/>
+          <a:ext cx="0" cy="0"/>
+          <a:chOff x="0" y="0"/>
+          <a:chExt cx="0" cy="0"/>
+        </a:xfrm>
+      </p:grpSpPr>
+      <p:sp>
+        <p:nvSpPr>
+          <p:cNvPr id="2" name="标题 1">
+            <a:extLst>
+              <a:ext uri="{FF2B5EF4-FFF2-40B4-BE49-F238E27FC236}">
+                <a16:creationId xmlns:a16="http://schemas.microsoft.com/office/drawing/2014/main" id="{5E785917-26FE-4899-8830-E3BE7C46362F}"/>
+              </a:ext>
+            </a:extLst>
+          </p:cNvPr>
+          <p:cNvSpPr>
+            <a:spLocks noGrp="1"/>
+          </p:cNvSpPr>
+          <p:nvPr>
+            <p:ph type="title"/>
+          </p:nvPr>
+        </p:nvSpPr>
+        <p:spPr/>
+        <p:txBody>
+          <a:bodyPr/>
+          <a:lstStyle/>
+          <a:p>
+            <a:r>
+              <a:rPr lang="zh-CN" altLang="en-US" dirty="0"/>
+              <a:t>练习题</a:t>
+            </a:r>
+          </a:p>
+        </p:txBody>
+      </p:sp>
+      <p:sp>
+        <p:nvSpPr>
+          <p:cNvPr id="3" name="内容占位符 2">
+            <a:extLst>
+              <a:ext uri="{FF2B5EF4-FFF2-40B4-BE49-F238E27FC236}">
+                <a16:creationId xmlns:a16="http://schemas.microsoft.com/office/drawing/2014/main" id="{184CB80B-3F39-49EB-AEEF-4C97ABDA7F7C}"/>
+              </a:ext>
+            </a:extLst>
+          </p:cNvPr>
+          <p:cNvSpPr>
+            <a:spLocks noGrp="1"/>
+          </p:cNvSpPr>
+          <p:nvPr>
+            <p:ph idx="1"/>
+          </p:nvPr>
+        </p:nvSpPr>
+        <p:spPr/>
+        <p:txBody>
+          <a:bodyPr/>
+          <a:lstStyle/>
+          <a:p>
+            <a:r>
+              <a:rPr lang="zh-CN" altLang="en-US" dirty="0">
+                <a:hlinkClick r:id="rId2"/>
+              </a:rPr>
+              <a:t>合并果子（洛谷</a:t>
+            </a:r>
+            <a:r>
+              <a:rPr lang="en-US" altLang="zh-CN" dirty="0">
+                <a:hlinkClick r:id="rId2"/>
+              </a:rPr>
+              <a:t>P1090</a:t>
+            </a:r>
+            <a:r>
+              <a:rPr lang="zh-CN" altLang="en-US" dirty="0">
+                <a:hlinkClick r:id="rId2"/>
+              </a:rPr>
+              <a:t>）</a:t>
+            </a:r>
+            <a:endParaRPr lang="en-US" altLang="zh-CN" dirty="0"/>
+          </a:p>
+          <a:p>
+            <a:r>
+              <a:rPr lang="zh-CN" altLang="en-US" dirty="0">
+                <a:hlinkClick r:id="rId3"/>
+              </a:rPr>
+              <a:t>木板（洛谷</a:t>
+            </a:r>
+            <a:r>
+              <a:rPr lang="en-US" altLang="zh-CN" dirty="0">
+                <a:hlinkClick r:id="rId3"/>
+              </a:rPr>
+              <a:t>P1334</a:t>
+            </a:r>
+            <a:r>
+              <a:rPr lang="zh-CN" altLang="en-US" dirty="0">
+                <a:hlinkClick r:id="rId3"/>
+              </a:rPr>
+              <a:t>）</a:t>
+            </a:r>
+            <a:endParaRPr lang="en-US" altLang="zh-CN" dirty="0"/>
+          </a:p>
+          <a:p>
+            <a:r>
+              <a:rPr lang="zh-CN" altLang="en-US" dirty="0">
+                <a:hlinkClick r:id="rId4"/>
+              </a:rPr>
+              <a:t>序列合并（洛谷</a:t>
+            </a:r>
+            <a:r>
+              <a:rPr lang="en-US" altLang="zh-CN" dirty="0">
+                <a:hlinkClick r:id="rId4"/>
+              </a:rPr>
+              <a:t>P1631</a:t>
+            </a:r>
+            <a:r>
+              <a:rPr lang="zh-CN" altLang="en-US" dirty="0">
+                <a:hlinkClick r:id="rId4"/>
+              </a:rPr>
+              <a:t>）</a:t>
+            </a:r>
+            <a:endParaRPr lang="en-US" altLang="zh-CN" b="1" dirty="0"/>
+          </a:p>
+          <a:p>
+            <a:r>
+              <a:rPr lang="zh-CN" altLang="en-US" dirty="0">
+                <a:hlinkClick r:id="rId5"/>
+              </a:rPr>
+              <a:t>单源最短路径（洛谷</a:t>
+            </a:r>
+            <a:r>
+              <a:rPr lang="en-US" altLang="zh-CN" dirty="0">
+                <a:hlinkClick r:id="rId5"/>
+              </a:rPr>
+              <a:t>P4779</a:t>
+            </a:r>
+            <a:r>
+              <a:rPr lang="zh-CN" altLang="en-US" dirty="0">
+                <a:hlinkClick r:id="rId5"/>
+              </a:rPr>
+              <a:t>）</a:t>
+            </a:r>
+            <a:endParaRPr lang="en-US" altLang="zh-CN" dirty="0"/>
+          </a:p>
+          <a:p>
+            <a:endParaRPr lang="en-US" altLang="zh-CN" dirty="0"/>
+          </a:p>
+          <a:p>
+            <a:endParaRPr lang="zh-CN" altLang="en-US" dirty="0"/>
+          </a:p>
+        </p:txBody>
+      </p:sp>
+    </p:spTree>
+    <p:extLst>
+      <p:ext uri="{BB962C8B-B14F-4D97-AF65-F5344CB8AC3E}">
+        <p14:creationId xmlns:p14="http://schemas.microsoft.com/office/powerpoint/2010/main" val="3238933494"/>
       </p:ext>
     </p:extLst>
   </p:cSld>
@@ -5343,8 +5605,8 @@
           </a:p>
         </p:txBody>
       </p:sp>
-      <mc:AlternateContent xmlns:mc="http://schemas.openxmlformats.org/markup-compatibility/2006">
-        <mc:Choice xmlns:a14="http://schemas.microsoft.com/office/drawing/2010/main" Requires="a14">
+      <mc:AlternateContent xmlns:mc="http://schemas.openxmlformats.org/markup-compatibility/2006" xmlns:a14="http://schemas.microsoft.com/office/drawing/2010/main">
+        <mc:Choice Requires="a14">
           <p:sp>
             <p:nvSpPr>
               <p:cNvPr id="3" name="内容占位符 2">
@@ -5638,7 +5900,7 @@
             </p:txBody>
           </p:sp>
         </mc:Choice>
-        <mc:Fallback>
+        <mc:Fallback xmlns="">
           <p:sp>
             <p:nvSpPr>
               <p:cNvPr id="3" name="内容占位符 2">
@@ -5877,6 +6139,13 @@
           <a:p>
             <a:r>
               <a:rPr lang="zh-CN" altLang="en-US" dirty="0"/>
+              <a:t>获取并删除最小的一个元素</a:t>
+            </a:r>
+            <a:endParaRPr lang="en-US" altLang="zh-CN" dirty="0"/>
+          </a:p>
+          <a:p>
+            <a:r>
+              <a:rPr lang="zh-CN" altLang="en-US" dirty="0"/>
               <a:t>获取并删除最小的两个元素</a:t>
             </a:r>
             <a:endParaRPr lang="en-US" altLang="zh-CN" dirty="0"/>
@@ -5911,6 +6180,134 @@
   <p:clrMapOvr>
     <a:masterClrMapping/>
   </p:clrMapOvr>
+  <p:timing>
+    <p:tnLst>
+      <p:par>
+        <p:cTn id="1" dur="indefinite" restart="never" nodeType="tmRoot">
+          <p:childTnLst>
+            <p:seq concurrent="1" nextAc="seek">
+              <p:cTn id="2" dur="indefinite" nodeType="mainSeq">
+                <p:childTnLst>
+                  <p:par>
+                    <p:cTn id="3" fill="hold">
+                      <p:stCondLst>
+                        <p:cond delay="indefinite"/>
+                      </p:stCondLst>
+                      <p:childTnLst>
+                        <p:par>
+                          <p:cTn id="4" fill="hold">
+                            <p:stCondLst>
+                              <p:cond delay="0"/>
+                            </p:stCondLst>
+                            <p:childTnLst>
+                              <p:par>
+                                <p:cTn id="5" presetID="1" presetClass="exit" presetSubtype="0" fill="hold" nodeType="clickEffect">
+                                  <p:stCondLst>
+                                    <p:cond delay="0"/>
+                                  </p:stCondLst>
+                                  <p:childTnLst>
+                                    <p:set>
+                                      <p:cBhvr>
+                                        <p:cTn id="6" dur="1" fill="hold">
+                                          <p:stCondLst>
+                                            <p:cond delay="0"/>
+                                          </p:stCondLst>
+                                        </p:cTn>
+                                        <p:tgtEl>
+                                          <p:spTgt spid="3">
+                                            <p:txEl>
+                                              <p:pRg st="0" end="0"/>
+                                            </p:txEl>
+                                          </p:spTgt>
+                                        </p:tgtEl>
+                                        <p:attrNameLst>
+                                          <p:attrName>style.visibility</p:attrName>
+                                        </p:attrNameLst>
+                                      </p:cBhvr>
+                                      <p:to>
+                                        <p:strVal val="hidden"/>
+                                      </p:to>
+                                    </p:set>
+                                  </p:childTnLst>
+                                </p:cTn>
+                              </p:par>
+                            </p:childTnLst>
+                          </p:cTn>
+                        </p:par>
+                      </p:childTnLst>
+                    </p:cTn>
+                  </p:par>
+                  <p:par>
+                    <p:cTn id="7" fill="hold">
+                      <p:stCondLst>
+                        <p:cond delay="indefinite"/>
+                      </p:stCondLst>
+                      <p:childTnLst>
+                        <p:par>
+                          <p:cTn id="8" fill="hold">
+                            <p:stCondLst>
+                              <p:cond delay="0"/>
+                            </p:stCondLst>
+                            <p:childTnLst>
+                              <p:par>
+                                <p:cTn id="9" presetID="1" presetClass="exit" presetSubtype="0" fill="hold" nodeType="clickEffect">
+                                  <p:stCondLst>
+                                    <p:cond delay="0"/>
+                                  </p:stCondLst>
+                                  <p:childTnLst>
+                                    <p:set>
+                                      <p:cBhvr>
+                                        <p:cTn id="10" dur="1" fill="hold">
+                                          <p:stCondLst>
+                                            <p:cond delay="0"/>
+                                          </p:stCondLst>
+                                        </p:cTn>
+                                        <p:tgtEl>
+                                          <p:spTgt spid="3">
+                                            <p:txEl>
+                                              <p:pRg st="1" end="1"/>
+                                            </p:txEl>
+                                          </p:spTgt>
+                                        </p:tgtEl>
+                                        <p:attrNameLst>
+                                          <p:attrName>style.visibility</p:attrName>
+                                        </p:attrNameLst>
+                                      </p:cBhvr>
+                                      <p:to>
+                                        <p:strVal val="hidden"/>
+                                      </p:to>
+                                    </p:set>
+                                  </p:childTnLst>
+                                </p:cTn>
+                              </p:par>
+                            </p:childTnLst>
+                          </p:cTn>
+                        </p:par>
+                      </p:childTnLst>
+                    </p:cTn>
+                  </p:par>
+                </p:childTnLst>
+              </p:cTn>
+              <p:prevCondLst>
+                <p:cond evt="onPrev" delay="0">
+                  <p:tgtEl>
+                    <p:sldTgt/>
+                  </p:tgtEl>
+                </p:cond>
+              </p:prevCondLst>
+              <p:nextCondLst>
+                <p:cond evt="onNext" delay="0">
+                  <p:tgtEl>
+                    <p:sldTgt/>
+                  </p:tgtEl>
+                </p:cond>
+              </p:nextCondLst>
+            </p:seq>
+          </p:childTnLst>
+        </p:cTn>
+      </p:par>
+    </p:tnLst>
+  </p:timing>
 </p:sld>
 </file>
 
@@ -6052,8 +6449,8 @@
           </a:p>
         </p:txBody>
       </p:sp>
-      <mc:AlternateContent xmlns:mc="http://schemas.openxmlformats.org/markup-compatibility/2006" xmlns:a14="http://schemas.microsoft.com/office/drawing/2010/main">
-        <mc:Choice Requires="a14">
+      <mc:AlternateContent xmlns:mc="http://schemas.openxmlformats.org/markup-compatibility/2006">
+        <mc:Choice xmlns:a14="http://schemas.microsoft.com/office/drawing/2010/main" Requires="a14">
           <p:sp>
             <p:nvSpPr>
               <p:cNvPr id="3" name="内容占位符 2">
@@ -6079,7 +6476,7 @@
               <a:p>
                 <a:r>
                   <a:rPr lang="zh-CN" altLang="en-US" dirty="0"/>
-                  <a:t>维护集合的最大值</a:t>
+                  <a:t>维护集合的最大值（最小值也是一个道理）</a:t>
                 </a:r>
                 <a:endParaRPr lang="en-US" altLang="zh-CN" dirty="0"/>
               </a:p>
@@ -6206,11 +6603,39 @@
                   <a:rPr lang="zh-CN" altLang="en-US" dirty="0"/>
                   <a:t>有这个需要的话，最好搞一个和堆同步的二叉搜索树</a:t>
                 </a:r>
+                <a:endParaRPr lang="en-US" altLang="zh-CN" dirty="0"/>
+              </a:p>
+              <a:p>
+                <a:pPr lvl="1"/>
+                <a:r>
+                  <a:rPr lang="zh-CN" altLang="en-US" dirty="0"/>
+                  <a:t>或者对于所有的元素进行标记，比如</a:t>
+                </a:r>
+                <a14:m>
+                  <m:oMath xmlns:m="http://schemas.openxmlformats.org/officeDocument/2006/math">
+                    <m:r>
+                      <a:rPr lang="en-US" altLang="zh-CN" b="0" i="1" smtClean="0">
+                        <a:latin typeface="Cambria Math" panose="02040503050406030204" pitchFamily="18" charset="0"/>
+                      </a:rPr>
+                      <m:t>𝑣𝑖𝑠</m:t>
+                    </m:r>
+                    <m:r>
+                      <a:rPr lang="en-US" altLang="zh-CN" b="0" i="1" smtClean="0">
+                        <a:latin typeface="Cambria Math" panose="02040503050406030204" pitchFamily="18" charset="0"/>
+                      </a:rPr>
+                      <m:t>[]</m:t>
+                    </m:r>
+                  </m:oMath>
+                </a14:m>
+                <a:r>
+                  <a:rPr lang="zh-CN" altLang="en-US" dirty="0"/>
+                  <a:t>数组</a:t>
+                </a:r>
               </a:p>
             </p:txBody>
           </p:sp>
         </mc:Choice>
-        <mc:Fallback xmlns="">
+        <mc:Fallback>
           <p:sp>
             <p:nvSpPr>
               <p:cNvPr id="3" name="内容占位符 2">
@@ -6437,6 +6862,36 @@
           <a:chExt cx="0" cy="0"/>
         </a:xfrm>
       </p:grpSpPr>
+      <p:pic>
+        <p:nvPicPr>
+          <p:cNvPr id="2" name="图片 1">
+            <a:extLst>
+              <a:ext uri="{FF2B5EF4-FFF2-40B4-BE49-F238E27FC236}">
+                <a16:creationId xmlns:a16="http://schemas.microsoft.com/office/drawing/2014/main" id="{230FE3D1-D040-4245-8A48-0BD30E8982A0}"/>
+              </a:ext>
+            </a:extLst>
+          </p:cNvPr>
+          <p:cNvPicPr>
+            <a:picLocks noChangeAspect="1"/>
+          </p:cNvPicPr>
+          <p:nvPr/>
+        </p:nvPicPr>
+        <p:blipFill>
+          <a:blip r:embed="rId2"/>
+          <a:stretch>
+            <a:fillRect/>
+          </a:stretch>
+        </p:blipFill>
+        <p:spPr>
+          <a:xfrm>
+            <a:off x="0" y="2273402"/>
+            <a:ext cx="9144000" cy="2311195"/>
+          </a:xfrm>
+          <a:prstGeom prst="rect">
+            <a:avLst/>
+          </a:prstGeom>
+        </p:spPr>
+      </p:pic>
     </p:spTree>
     <p:extLst>
       <p:ext uri="{BB962C8B-B14F-4D97-AF65-F5344CB8AC3E}">

</xml_diff>